<commit_message>
Added some papers on Si detectors.
</commit_message>
<xml_diff>
--- a/2018Oct-Tutorial_HiRACsICalibrations.pptx
+++ b/2018Oct-Tutorial_HiRACsICalibrations.pptx
@@ -244,7 +244,7 @@
           <a:p>
             <a:fld id="{56884FD5-078F-452E-9E34-3872B0A18C88}" type="datetimeFigureOut">
               <a:rPr lang="en-US" smtClean="0"/>
-              <a:t>10/24/2018</a:t>
+              <a:t>10/25/2018</a:t>
             </a:fld>
             <a:endParaRPr lang="en-US"/>
           </a:p>
@@ -727,7 +727,7 @@
           <a:p>
             <a:fld id="{2AB85655-92EE-4FFE-AD52-8C3D789CC0B5}" type="datetimeFigureOut">
               <a:rPr lang="en-US" smtClean="0"/>
-              <a:t>10/24/2018</a:t>
+              <a:t>10/25/2018</a:t>
             </a:fld>
             <a:endParaRPr lang="en-US"/>
           </a:p>
@@ -897,7 +897,7 @@
           <a:p>
             <a:fld id="{2AB85655-92EE-4FFE-AD52-8C3D789CC0B5}" type="datetimeFigureOut">
               <a:rPr lang="en-US" smtClean="0"/>
-              <a:t>10/24/2018</a:t>
+              <a:t>10/25/2018</a:t>
             </a:fld>
             <a:endParaRPr lang="en-US"/>
           </a:p>
@@ -1077,7 +1077,7 @@
           <a:p>
             <a:fld id="{2AB85655-92EE-4FFE-AD52-8C3D789CC0B5}" type="datetimeFigureOut">
               <a:rPr lang="en-US" smtClean="0"/>
-              <a:t>10/24/2018</a:t>
+              <a:t>10/25/2018</a:t>
             </a:fld>
             <a:endParaRPr lang="en-US"/>
           </a:p>
@@ -1247,7 +1247,7 @@
           <a:p>
             <a:fld id="{2AB85655-92EE-4FFE-AD52-8C3D789CC0B5}" type="datetimeFigureOut">
               <a:rPr lang="en-US" smtClean="0"/>
-              <a:t>10/24/2018</a:t>
+              <a:t>10/25/2018</a:t>
             </a:fld>
             <a:endParaRPr lang="en-US"/>
           </a:p>
@@ -1493,7 +1493,7 @@
           <a:p>
             <a:fld id="{2AB85655-92EE-4FFE-AD52-8C3D789CC0B5}" type="datetimeFigureOut">
               <a:rPr lang="en-US" smtClean="0"/>
-              <a:t>10/24/2018</a:t>
+              <a:t>10/25/2018</a:t>
             </a:fld>
             <a:endParaRPr lang="en-US"/>
           </a:p>
@@ -1725,7 +1725,7 @@
           <a:p>
             <a:fld id="{2AB85655-92EE-4FFE-AD52-8C3D789CC0B5}" type="datetimeFigureOut">
               <a:rPr lang="en-US" smtClean="0"/>
-              <a:t>10/24/2018</a:t>
+              <a:t>10/25/2018</a:t>
             </a:fld>
             <a:endParaRPr lang="en-US"/>
           </a:p>
@@ -2092,7 +2092,7 @@
           <a:p>
             <a:fld id="{2AB85655-92EE-4FFE-AD52-8C3D789CC0B5}" type="datetimeFigureOut">
               <a:rPr lang="en-US" smtClean="0"/>
-              <a:t>10/24/2018</a:t>
+              <a:t>10/25/2018</a:t>
             </a:fld>
             <a:endParaRPr lang="en-US"/>
           </a:p>
@@ -2210,7 +2210,7 @@
           <a:p>
             <a:fld id="{2AB85655-92EE-4FFE-AD52-8C3D789CC0B5}" type="datetimeFigureOut">
               <a:rPr lang="en-US" smtClean="0"/>
-              <a:t>10/24/2018</a:t>
+              <a:t>10/25/2018</a:t>
             </a:fld>
             <a:endParaRPr lang="en-US"/>
           </a:p>
@@ -2305,7 +2305,7 @@
           <a:p>
             <a:fld id="{2AB85655-92EE-4FFE-AD52-8C3D789CC0B5}" type="datetimeFigureOut">
               <a:rPr lang="en-US" smtClean="0"/>
-              <a:t>10/24/2018</a:t>
+              <a:t>10/25/2018</a:t>
             </a:fld>
             <a:endParaRPr lang="en-US"/>
           </a:p>
@@ -2582,7 +2582,7 @@
           <a:p>
             <a:fld id="{2AB85655-92EE-4FFE-AD52-8C3D789CC0B5}" type="datetimeFigureOut">
               <a:rPr lang="en-US" smtClean="0"/>
-              <a:t>10/24/2018</a:t>
+              <a:t>10/25/2018</a:t>
             </a:fld>
             <a:endParaRPr lang="en-US"/>
           </a:p>
@@ -2835,7 +2835,7 @@
           <a:p>
             <a:fld id="{2AB85655-92EE-4FFE-AD52-8C3D789CC0B5}" type="datetimeFigureOut">
               <a:rPr lang="en-US" smtClean="0"/>
-              <a:t>10/24/2018</a:t>
+              <a:t>10/25/2018</a:t>
             </a:fld>
             <a:endParaRPr lang="en-US"/>
           </a:p>
@@ -3048,7 +3048,7 @@
           <a:p>
             <a:fld id="{2AB85655-92EE-4FFE-AD52-8C3D789CC0B5}" type="datetimeFigureOut">
               <a:rPr lang="en-US" smtClean="0"/>
-              <a:t>10/24/2018</a:t>
+              <a:t>10/25/2018</a:t>
             </a:fld>
             <a:endParaRPr lang="en-US"/>
           </a:p>
@@ -9615,33 +9615,7 @@
                 <a:latin typeface="Times New Roman" panose="02020603050405020304" pitchFamily="18" charset="0"/>
                 <a:cs typeface="Times New Roman" panose="02020603050405020304" pitchFamily="18" charset="0"/>
               </a:rPr>
-              <a:t>et </a:t>
-            </a:r>
-            <a:r>
-              <a:rPr lang="en-US" altLang="zh-CN" sz="4400" b="1" u="sng" dirty="0" smtClean="0">
-                <a:solidFill>
-                  <a:schemeClr val="tx1">
-                    <a:lumMod val="95000"/>
-                    <a:lumOff val="5000"/>
-                  </a:schemeClr>
-                </a:solidFill>
-                <a:latin typeface="Times New Roman" panose="02020603050405020304" pitchFamily="18" charset="0"/>
-                <a:cs typeface="Times New Roman" panose="02020603050405020304" pitchFamily="18" charset="0"/>
-              </a:rPr>
-              <a:t>kinematics </a:t>
-            </a:r>
-            <a:r>
-              <a:rPr lang="en-US" altLang="zh-CN" sz="4400" b="1" u="sng" dirty="0" smtClean="0">
-                <a:solidFill>
-                  <a:schemeClr val="tx1">
-                    <a:lumMod val="95000"/>
-                    <a:lumOff val="5000"/>
-                  </a:schemeClr>
-                </a:solidFill>
-                <a:latin typeface="Times New Roman" panose="02020603050405020304" pitchFamily="18" charset="0"/>
-                <a:cs typeface="Times New Roman" panose="02020603050405020304" pitchFamily="18" charset="0"/>
-              </a:rPr>
-              <a:t>points?</a:t>
+              <a:t>et kinematics points?</a:t>
             </a:r>
           </a:p>
         </p:txBody>
@@ -10839,21 +10813,7 @@
                 <a:latin typeface="Times New Roman" panose="02020603050405020304" pitchFamily="18" charset="0"/>
                 <a:cs typeface="Times New Roman" panose="02020603050405020304" pitchFamily="18" charset="0"/>
               </a:rPr>
-              <a:t>Step </a:t>
-            </a:r>
-            <a:r>
-              <a:rPr lang="en-US" b="1" u="sng" dirty="0" smtClean="0">
-                <a:latin typeface="Times New Roman" panose="02020603050405020304" pitchFamily="18" charset="0"/>
-                <a:cs typeface="Times New Roman" panose="02020603050405020304" pitchFamily="18" charset="0"/>
-              </a:rPr>
-              <a:t>2</a:t>
-            </a:r>
-            <a:r>
-              <a:rPr lang="en-US" b="1" u="sng" dirty="0" smtClean="0">
-                <a:latin typeface="Times New Roman" panose="02020603050405020304" pitchFamily="18" charset="0"/>
-                <a:cs typeface="Times New Roman" panose="02020603050405020304" pitchFamily="18" charset="0"/>
-              </a:rPr>
-              <a:t>: Make cuts for the kinematics lines</a:t>
+              <a:t>Step 2: Make cuts for the kinematics lines</a:t>
             </a:r>
             <a:endParaRPr lang="en-US" dirty="0" smtClean="0">
               <a:solidFill>
@@ -12098,21 +12058,7 @@
                 <a:latin typeface="Times New Roman" panose="02020603050405020304" pitchFamily="18" charset="0"/>
                 <a:cs typeface="Times New Roman" panose="02020603050405020304" pitchFamily="18" charset="0"/>
               </a:rPr>
-              <a:t>Step </a:t>
-            </a:r>
-            <a:r>
-              <a:rPr lang="en-US" b="1" u="sng" dirty="0" smtClean="0">
-                <a:latin typeface="Times New Roman" panose="02020603050405020304" pitchFamily="18" charset="0"/>
-                <a:cs typeface="Times New Roman" panose="02020603050405020304" pitchFamily="18" charset="0"/>
-              </a:rPr>
-              <a:t>4</a:t>
-            </a:r>
-            <a:r>
-              <a:rPr lang="en-US" b="1" u="sng" dirty="0" smtClean="0">
-                <a:latin typeface="Times New Roman" panose="02020603050405020304" pitchFamily="18" charset="0"/>
-                <a:cs typeface="Times New Roman" panose="02020603050405020304" pitchFamily="18" charset="0"/>
-              </a:rPr>
-              <a:t>: Estimate the errors of points</a:t>
+              <a:t>Step 4: Estimate the errors of points</a:t>
             </a:r>
             <a:endParaRPr lang="en-US" dirty="0" smtClean="0">
               <a:solidFill>
@@ -12718,10 +12664,6 @@
               </a:rPr>
               <a:t> (MeV)</a:t>
             </a:r>
-            <a:endParaRPr lang="en-US" altLang="zh-CN" dirty="0">
-              <a:latin typeface="Times New Roman" panose="02020603050405020304" pitchFamily="18" charset="0"/>
-              <a:cs typeface="Times New Roman" panose="02020603050405020304" pitchFamily="18" charset="0"/>
-            </a:endParaRPr>
           </a:p>
         </p:txBody>
       </p:sp>
@@ -13667,31 +13609,8 @@
                 <a:latin typeface="Times New Roman" panose="02020603050405020304" pitchFamily="18" charset="0"/>
                 <a:cs typeface="Times New Roman" panose="02020603050405020304" pitchFamily="18" charset="0"/>
               </a:rPr>
-              <a:t>II. How to </a:t>
-            </a:r>
-            <a:r>
-              <a:rPr lang="en-US" altLang="zh-CN" sz="4000" b="1" u="sng" dirty="0" smtClean="0">
-                <a:solidFill>
-                  <a:schemeClr val="tx1">
-                    <a:lumMod val="95000"/>
-                    <a:lumOff val="5000"/>
-                  </a:schemeClr>
-                </a:solidFill>
-                <a:latin typeface="Times New Roman" panose="02020603050405020304" pitchFamily="18" charset="0"/>
-                <a:cs typeface="Times New Roman" panose="02020603050405020304" pitchFamily="18" charset="0"/>
-              </a:rPr>
-              <a:t>do simultaneous fit?</a:t>
-            </a:r>
-            <a:endParaRPr lang="en-US" altLang="zh-CN" sz="4000" b="1" u="sng" dirty="0" smtClean="0">
-              <a:solidFill>
-                <a:schemeClr val="tx1">
-                  <a:lumMod val="95000"/>
-                  <a:lumOff val="5000"/>
-                </a:schemeClr>
-              </a:solidFill>
-              <a:latin typeface="Times New Roman" panose="02020603050405020304" pitchFamily="18" charset="0"/>
-              <a:cs typeface="Times New Roman" panose="02020603050405020304" pitchFamily="18" charset="0"/>
-            </a:endParaRPr>
+              <a:t>II. How to do simultaneous fit?</a:t>
+            </a:r>
           </a:p>
         </p:txBody>
       </p:sp>
@@ -14390,6 +14309,178 @@
           <a:chExt cx="0" cy="0"/>
         </a:xfrm>
       </p:grpSpPr>
+      <p:sp>
+        <p:nvSpPr>
+          <p:cNvPr id="2" name="TextBox 1"/>
+          <p:cNvSpPr txBox="1"/>
+          <p:nvPr/>
+        </p:nvSpPr>
+        <p:spPr>
+          <a:xfrm>
+            <a:off x="403412" y="286871"/>
+            <a:ext cx="6678706" cy="369332"/>
+          </a:xfrm>
+          <a:prstGeom prst="rect">
+            <a:avLst/>
+          </a:prstGeom>
+          <a:noFill/>
+        </p:spPr>
+        <p:txBody>
+          <a:bodyPr wrap="square" rtlCol="0">
+            <a:spAutoFit/>
+          </a:bodyPr>
+          <a:lstStyle/>
+          <a:p>
+            <a:r>
+              <a:rPr lang="en-US" b="1" u="sng" dirty="0" smtClean="0">
+                <a:latin typeface="Times New Roman" panose="02020603050405020304" pitchFamily="18" charset="0"/>
+                <a:cs typeface="Times New Roman" panose="02020603050405020304" pitchFamily="18" charset="0"/>
+              </a:rPr>
+              <a:t>Q3: </a:t>
+            </a:r>
+            <a:r>
+              <a:rPr lang="en-US" b="1" u="sng" dirty="0" smtClean="0">
+                <a:latin typeface="Times New Roman" panose="02020603050405020304" pitchFamily="18" charset="0"/>
+                <a:cs typeface="Times New Roman" panose="02020603050405020304" pitchFamily="18" charset="0"/>
+              </a:rPr>
+              <a:t>How to </a:t>
+            </a:r>
+            <a:r>
+              <a:rPr lang="en-US" b="1" u="sng" dirty="0" smtClean="0">
+                <a:latin typeface="Times New Roman" panose="02020603050405020304" pitchFamily="18" charset="0"/>
+                <a:cs typeface="Times New Roman" panose="02020603050405020304" pitchFamily="18" charset="0"/>
+              </a:rPr>
+              <a:t>use Fermi function fit to get punch-through points</a:t>
+            </a:r>
+            <a:r>
+              <a:rPr lang="en-US" b="1" u="sng" dirty="0" smtClean="0">
+                <a:latin typeface="Times New Roman" panose="02020603050405020304" pitchFamily="18" charset="0"/>
+                <a:cs typeface="Times New Roman" panose="02020603050405020304" pitchFamily="18" charset="0"/>
+              </a:rPr>
+              <a:t> </a:t>
+            </a:r>
+            <a:r>
+              <a:rPr lang="en-US" b="1" u="sng" dirty="0" smtClean="0">
+                <a:latin typeface="Times New Roman" panose="02020603050405020304" pitchFamily="18" charset="0"/>
+                <a:cs typeface="Times New Roman" panose="02020603050405020304" pitchFamily="18" charset="0"/>
+              </a:rPr>
+              <a:t>?</a:t>
+            </a:r>
+            <a:endParaRPr lang="en-US" b="1" u="sng" dirty="0">
+              <a:latin typeface="Times New Roman" panose="02020603050405020304" pitchFamily="18" charset="0"/>
+              <a:cs typeface="Times New Roman" panose="02020603050405020304" pitchFamily="18" charset="0"/>
+            </a:endParaRPr>
+          </a:p>
+        </p:txBody>
+      </p:sp>
+      <p:pic>
+        <p:nvPicPr>
+          <p:cNvPr id="4" name="Picture 3"/>
+          <p:cNvPicPr>
+            <a:picLocks noChangeAspect="1"/>
+          </p:cNvPicPr>
+          <p:nvPr/>
+        </p:nvPicPr>
+        <p:blipFill>
+          <a:blip r:embed="rId2"/>
+          <a:stretch>
+            <a:fillRect/>
+          </a:stretch>
+        </p:blipFill>
+        <p:spPr>
+          <a:xfrm>
+            <a:off x="5765158" y="1434445"/>
+            <a:ext cx="6008152" cy="4304685"/>
+          </a:xfrm>
+          <a:prstGeom prst="rect">
+            <a:avLst/>
+          </a:prstGeom>
+        </p:spPr>
+      </p:pic>
+      <p:sp>
+        <p:nvSpPr>
+          <p:cNvPr id="5" name="TextBox 4"/>
+          <p:cNvSpPr txBox="1"/>
+          <p:nvPr/>
+        </p:nvSpPr>
+        <p:spPr>
+          <a:xfrm rot="16200000">
+            <a:off x="8380928" y="3110577"/>
+            <a:ext cx="2024913" cy="276999"/>
+          </a:xfrm>
+          <a:prstGeom prst="rect">
+            <a:avLst/>
+          </a:prstGeom>
+          <a:noFill/>
+        </p:spPr>
+        <p:txBody>
+          <a:bodyPr wrap="none" rtlCol="0">
+            <a:spAutoFit/>
+          </a:bodyPr>
+          <a:lstStyle/>
+          <a:p>
+            <a:r>
+              <a:rPr lang="en-US" sz="1200" b="1" dirty="0" smtClean="0">
+                <a:solidFill>
+                  <a:srgbClr val="FF0000"/>
+                </a:solidFill>
+              </a:rPr>
+              <a:t>Current punch through point</a:t>
+            </a:r>
+            <a:endParaRPr lang="en-US" sz="1200" b="1" dirty="0">
+              <a:solidFill>
+                <a:srgbClr val="FF0000"/>
+              </a:solidFill>
+            </a:endParaRPr>
+          </a:p>
+        </p:txBody>
+      </p:sp>
+      <p:sp>
+        <p:nvSpPr>
+          <p:cNvPr id="6" name="TextBox 5"/>
+          <p:cNvSpPr txBox="1"/>
+          <p:nvPr/>
+        </p:nvSpPr>
+        <p:spPr>
+          <a:xfrm rot="16200000">
+            <a:off x="8694721" y="3624240"/>
+            <a:ext cx="1905330" cy="276999"/>
+          </a:xfrm>
+          <a:prstGeom prst="rect">
+            <a:avLst/>
+          </a:prstGeom>
+          <a:noFill/>
+        </p:spPr>
+        <p:txBody>
+          <a:bodyPr wrap="none" rtlCol="0">
+            <a:spAutoFit/>
+          </a:bodyPr>
+          <a:lstStyle/>
+          <a:p>
+            <a:r>
+              <a:rPr lang="en-US" sz="1200" b="1" dirty="0" smtClean="0">
+                <a:solidFill>
+                  <a:srgbClr val="FF0000"/>
+                </a:solidFill>
+              </a:rPr>
+              <a:t>Prediction via </a:t>
+            </a:r>
+            <a:r>
+              <a:rPr lang="en-US" sz="1200" b="1" dirty="0" err="1" smtClean="0">
+                <a:solidFill>
+                  <a:srgbClr val="FF0000"/>
+                </a:solidFill>
+              </a:rPr>
+              <a:t>exrapolation</a:t>
+            </a:r>
+            <a:endParaRPr lang="en-US" sz="1200" b="1" dirty="0">
+              <a:solidFill>
+                <a:srgbClr val="FF0000"/>
+              </a:solidFill>
+            </a:endParaRPr>
+          </a:p>
+        </p:txBody>
+      </p:sp>
     </p:spTree>
     <p:extLst>
       <p:ext uri="{BB962C8B-B14F-4D97-AF65-F5344CB8AC3E}">
@@ -14735,21 +14826,7 @@
                 <a:latin typeface="Times New Roman" panose="02020603050405020304" pitchFamily="18" charset="0"/>
                 <a:cs typeface="Times New Roman" panose="02020603050405020304" pitchFamily="18" charset="0"/>
               </a:rPr>
-              <a:t>●</a:t>
-            </a:r>
-            <a:r>
-              <a:rPr lang="en-US" dirty="0" smtClean="0">
-                <a:latin typeface="Times New Roman" panose="02020603050405020304" pitchFamily="18" charset="0"/>
-                <a:cs typeface="Times New Roman" panose="02020603050405020304" pitchFamily="18" charset="0"/>
-              </a:rPr>
-              <a:t> </a:t>
-            </a:r>
-            <a:r>
-              <a:rPr lang="en-US" dirty="0" smtClean="0">
-                <a:latin typeface="Times New Roman" panose="02020603050405020304" pitchFamily="18" charset="0"/>
-                <a:cs typeface="Times New Roman" panose="02020603050405020304" pitchFamily="18" charset="0"/>
-              </a:rPr>
-              <a:t>Do a </a:t>
+              <a:t>● Do a </a:t>
             </a:r>
             <a:r>
               <a:rPr lang="en-US" dirty="0" smtClean="0">
@@ -14870,14 +14947,7 @@
                 <a:latin typeface="Times New Roman" panose="02020603050405020304" pitchFamily="18" charset="0"/>
                 <a:cs typeface="Times New Roman" panose="02020603050405020304" pitchFamily="18" charset="0"/>
               </a:rPr>
-              <a:t>Within </a:t>
-            </a:r>
-            <a:r>
-              <a:rPr lang="en-US" altLang="zh-CN" dirty="0" smtClean="0">
-                <a:latin typeface="Times New Roman" panose="02020603050405020304" pitchFamily="18" charset="0"/>
-                <a:cs typeface="Times New Roman" panose="02020603050405020304" pitchFamily="18" charset="0"/>
-              </a:rPr>
-              <a:t>the cut region, take samples points of a constant bin step in X-axis, make projection  </a:t>
+              <a:t>Within the cut region, take samples points of a constant bin step in X-axis, make projection  </a:t>
             </a:r>
             <a:r>
               <a:rPr lang="en-US" dirty="0" smtClean="0">
@@ -15578,14 +15648,7 @@
                 <a:latin typeface="Times New Roman" panose="02020603050405020304" pitchFamily="18" charset="0"/>
                 <a:cs typeface="Times New Roman" panose="02020603050405020304" pitchFamily="18" charset="0"/>
               </a:rPr>
-              <a:t> errors of ∆E-E </a:t>
-            </a:r>
-            <a:r>
-              <a:rPr lang="en-US" dirty="0" smtClean="0">
-                <a:latin typeface="Times New Roman" panose="02020603050405020304" pitchFamily="18" charset="0"/>
-                <a:cs typeface="Times New Roman" panose="02020603050405020304" pitchFamily="18" charset="0"/>
-              </a:rPr>
-              <a:t>points</a:t>
+              <a:t> errors of ∆E-E points</a:t>
             </a:r>
           </a:p>
           <a:p>
@@ -15662,20 +15725,105 @@
                 <a:latin typeface="Times New Roman" panose="02020603050405020304" pitchFamily="18" charset="0"/>
                 <a:cs typeface="Times New Roman" panose="02020603050405020304" pitchFamily="18" charset="0"/>
               </a:rPr>
-              <a:t> For </a:t>
+              <a:t> For a certain channel  number of </a:t>
+            </a:r>
+            <a:r>
+              <a:rPr lang="en-US" dirty="0" err="1" smtClean="0">
+                <a:latin typeface="Times New Roman" panose="02020603050405020304" pitchFamily="18" charset="0"/>
+                <a:cs typeface="Times New Roman" panose="02020603050405020304" pitchFamily="18" charset="0"/>
+              </a:rPr>
+              <a:t>CsIch</a:t>
             </a:r>
             <a:r>
               <a:rPr lang="en-US" dirty="0" smtClean="0">
                 <a:latin typeface="Times New Roman" panose="02020603050405020304" pitchFamily="18" charset="0"/>
                 <a:cs typeface="Times New Roman" panose="02020603050405020304" pitchFamily="18" charset="0"/>
               </a:rPr>
-              <a:t>a certain channel  number of </a:t>
+              <a:t>, the error </a:t>
             </a:r>
             <a:r>
               <a:rPr lang="en-US" dirty="0" err="1" smtClean="0">
                 <a:latin typeface="Times New Roman" panose="02020603050405020304" pitchFamily="18" charset="0"/>
                 <a:cs typeface="Times New Roman" panose="02020603050405020304" pitchFamily="18" charset="0"/>
               </a:rPr>
+              <a:t>err_CsIch</a:t>
+            </a:r>
+            <a:r>
+              <a:rPr lang="en-US" dirty="0" smtClean="0">
+                <a:latin typeface="Times New Roman" panose="02020603050405020304" pitchFamily="18" charset="0"/>
+                <a:cs typeface="Times New Roman" panose="02020603050405020304" pitchFamily="18" charset="0"/>
+              </a:rPr>
+              <a:t>=0.5, set by hand</a:t>
+            </a:r>
+          </a:p>
+          <a:p>
+            <a:r>
+              <a:rPr lang="en-US" dirty="0"/>
+              <a:t> </a:t>
+            </a:r>
+            <a:r>
+              <a:rPr lang="en-US" dirty="0">
+                <a:latin typeface="Times New Roman" panose="02020603050405020304" pitchFamily="18" charset="0"/>
+                <a:cs typeface="Times New Roman" panose="02020603050405020304" pitchFamily="18" charset="0"/>
+              </a:rPr>
+              <a:t>●  </a:t>
+            </a:r>
+            <a:r>
+              <a:rPr lang="en-US" dirty="0" smtClean="0">
+                <a:latin typeface="Times New Roman" panose="02020603050405020304" pitchFamily="18" charset="0"/>
+                <a:cs typeface="Times New Roman" panose="02020603050405020304" pitchFamily="18" charset="0"/>
+              </a:rPr>
+              <a:t>For errors of voltage: </a:t>
+            </a:r>
+          </a:p>
+          <a:p>
+            <a:r>
+              <a:rPr lang="en-US" dirty="0">
+                <a:latin typeface="Times New Roman" panose="02020603050405020304" pitchFamily="18" charset="0"/>
+                <a:cs typeface="Times New Roman" panose="02020603050405020304" pitchFamily="18" charset="0"/>
+              </a:rPr>
+              <a:t> </a:t>
+            </a:r>
+            <a:r>
+              <a:rPr lang="en-US" dirty="0" smtClean="0">
+                <a:latin typeface="Times New Roman" panose="02020603050405020304" pitchFamily="18" charset="0"/>
+                <a:cs typeface="Times New Roman" panose="02020603050405020304" pitchFamily="18" charset="0"/>
+              </a:rPr>
+              <a:t>       </a:t>
+            </a:r>
+            <a:r>
+              <a:rPr lang="en-US" dirty="0" err="1" smtClean="0">
+                <a:latin typeface="Times New Roman" panose="02020603050405020304" pitchFamily="18" charset="0"/>
+                <a:cs typeface="Times New Roman" panose="02020603050405020304" pitchFamily="18" charset="0"/>
+              </a:rPr>
+              <a:t>CsIV</a:t>
+            </a:r>
+            <a:r>
+              <a:rPr lang="en-US" dirty="0" smtClean="0">
+                <a:latin typeface="Times New Roman" panose="02020603050405020304" pitchFamily="18" charset="0"/>
+                <a:cs typeface="Times New Roman" panose="02020603050405020304" pitchFamily="18" charset="0"/>
+              </a:rPr>
+              <a:t>       = </a:t>
+            </a:r>
+            <a:r>
+              <a:rPr lang="en-US" dirty="0" err="1" smtClean="0">
+                <a:latin typeface="Times New Roman" panose="02020603050405020304" pitchFamily="18" charset="0"/>
+                <a:cs typeface="Times New Roman" panose="02020603050405020304" pitchFamily="18" charset="0"/>
+              </a:rPr>
+              <a:t>CsICalibrationModule.GetVoltageValue</a:t>
+            </a:r>
+            <a:r>
+              <a:rPr lang="en-US" dirty="0" smtClean="0">
+                <a:latin typeface="Times New Roman" panose="02020603050405020304" pitchFamily="18" charset="0"/>
+                <a:cs typeface="Times New Roman" panose="02020603050405020304" pitchFamily="18" charset="0"/>
+              </a:rPr>
+              <a:t>(</a:t>
+            </a:r>
+            <a:r>
+              <a:rPr lang="en-US" dirty="0" err="1" smtClean="0">
+                <a:latin typeface="Times New Roman" panose="02020603050405020304" pitchFamily="18" charset="0"/>
+                <a:cs typeface="Times New Roman" panose="02020603050405020304" pitchFamily="18" charset="0"/>
+              </a:rPr>
               <a:t>CsIch</a:t>
             </a:r>
             <a:r>
@@ -15683,29 +15831,138 @@
                 <a:latin typeface="Times New Roman" panose="02020603050405020304" pitchFamily="18" charset="0"/>
                 <a:cs typeface="Times New Roman" panose="02020603050405020304" pitchFamily="18" charset="0"/>
               </a:rPr>
-              <a:t>, the error </a:t>
+              <a:t>, </a:t>
             </a:r>
             <a:r>
               <a:rPr lang="en-US" dirty="0" err="1" smtClean="0">
                 <a:latin typeface="Times New Roman" panose="02020603050405020304" pitchFamily="18" charset="0"/>
                 <a:cs typeface="Times New Roman" panose="02020603050405020304" pitchFamily="18" charset="0"/>
               </a:rPr>
-              <a:t>err_CsIch</a:t>
+              <a:t>telnum</a:t>
             </a:r>
             <a:r>
               <a:rPr lang="en-US" dirty="0" smtClean="0">
                 <a:latin typeface="Times New Roman" panose="02020603050405020304" pitchFamily="18" charset="0"/>
                 <a:cs typeface="Times New Roman" panose="02020603050405020304" pitchFamily="18" charset="0"/>
               </a:rPr>
-              <a:t>=0.5, set by </a:t>
+              <a:t>, </a:t>
+            </a:r>
+            <a:r>
+              <a:rPr lang="en-US" dirty="0" err="1" smtClean="0">
+                <a:latin typeface="Times New Roman" panose="02020603050405020304" pitchFamily="18" charset="0"/>
+                <a:cs typeface="Times New Roman" panose="02020603050405020304" pitchFamily="18" charset="0"/>
+              </a:rPr>
+              <a:t>csinum</a:t>
             </a:r>
             <a:r>
               <a:rPr lang="en-US" dirty="0" smtClean="0">
                 <a:latin typeface="Times New Roman" panose="02020603050405020304" pitchFamily="18" charset="0"/>
                 <a:cs typeface="Times New Roman" panose="02020603050405020304" pitchFamily="18" charset="0"/>
               </a:rPr>
-              <a:t>hand</a:t>
-            </a:r>
+              <a:t>);</a:t>
+            </a:r>
+          </a:p>
+          <a:p>
+            <a:r>
+              <a:rPr lang="en-US" dirty="0">
+                <a:latin typeface="Times New Roman" panose="02020603050405020304" pitchFamily="18" charset="0"/>
+                <a:cs typeface="Times New Roman" panose="02020603050405020304" pitchFamily="18" charset="0"/>
+              </a:rPr>
+              <a:t> </a:t>
+            </a:r>
+            <a:r>
+              <a:rPr lang="en-US" dirty="0" smtClean="0">
+                <a:latin typeface="Times New Roman" panose="02020603050405020304" pitchFamily="18" charset="0"/>
+                <a:cs typeface="Times New Roman" panose="02020603050405020304" pitchFamily="18" charset="0"/>
+              </a:rPr>
+              <a:t>       </a:t>
+            </a:r>
+            <a:r>
+              <a:rPr lang="en-US" dirty="0" err="1" smtClean="0">
+                <a:latin typeface="Times New Roman" panose="02020603050405020304" pitchFamily="18" charset="0"/>
+                <a:cs typeface="Times New Roman" panose="02020603050405020304" pitchFamily="18" charset="0"/>
+              </a:rPr>
+              <a:t>err_CsIV</a:t>
+            </a:r>
+            <a:r>
+              <a:rPr lang="en-US" dirty="0" smtClean="0">
+                <a:latin typeface="Times New Roman" panose="02020603050405020304" pitchFamily="18" charset="0"/>
+                <a:cs typeface="Times New Roman" panose="02020603050405020304" pitchFamily="18" charset="0"/>
+              </a:rPr>
+              <a:t> = </a:t>
+            </a:r>
+            <a:r>
+              <a:rPr lang="en-US" dirty="0" err="1" smtClean="0">
+                <a:latin typeface="Times New Roman" panose="02020603050405020304" pitchFamily="18" charset="0"/>
+                <a:cs typeface="Times New Roman" panose="02020603050405020304" pitchFamily="18" charset="0"/>
+              </a:rPr>
+              <a:t>CsICalibrationModule.GetVoltageValue</a:t>
+            </a:r>
+            <a:r>
+              <a:rPr lang="en-US" dirty="0" smtClean="0">
+                <a:latin typeface="Times New Roman" panose="02020603050405020304" pitchFamily="18" charset="0"/>
+                <a:cs typeface="Times New Roman" panose="02020603050405020304" pitchFamily="18" charset="0"/>
+              </a:rPr>
+              <a:t>(</a:t>
+            </a:r>
+            <a:r>
+              <a:rPr lang="en-US" dirty="0" err="1" smtClean="0">
+                <a:latin typeface="Times New Roman" panose="02020603050405020304" pitchFamily="18" charset="0"/>
+                <a:cs typeface="Times New Roman" panose="02020603050405020304" pitchFamily="18" charset="0"/>
+              </a:rPr>
+              <a:t>CsIch+err_CsIch</a:t>
+            </a:r>
+            <a:r>
+              <a:rPr lang="en-US" dirty="0" smtClean="0">
+                <a:latin typeface="Times New Roman" panose="02020603050405020304" pitchFamily="18" charset="0"/>
+                <a:cs typeface="Times New Roman" panose="02020603050405020304" pitchFamily="18" charset="0"/>
+              </a:rPr>
+              <a:t>, </a:t>
+            </a:r>
+            <a:r>
+              <a:rPr lang="en-US" dirty="0" err="1" smtClean="0">
+                <a:latin typeface="Times New Roman" panose="02020603050405020304" pitchFamily="18" charset="0"/>
+                <a:cs typeface="Times New Roman" panose="02020603050405020304" pitchFamily="18" charset="0"/>
+              </a:rPr>
+              <a:t>telnum</a:t>
+            </a:r>
+            <a:r>
+              <a:rPr lang="en-US" dirty="0" smtClean="0">
+                <a:latin typeface="Times New Roman" panose="02020603050405020304" pitchFamily="18" charset="0"/>
+                <a:cs typeface="Times New Roman" panose="02020603050405020304" pitchFamily="18" charset="0"/>
+              </a:rPr>
+              <a:t>, </a:t>
+            </a:r>
+            <a:r>
+              <a:rPr lang="en-US" dirty="0" err="1" smtClean="0">
+                <a:latin typeface="Times New Roman" panose="02020603050405020304" pitchFamily="18" charset="0"/>
+                <a:cs typeface="Times New Roman" panose="02020603050405020304" pitchFamily="18" charset="0"/>
+              </a:rPr>
+              <a:t>csinum</a:t>
+            </a:r>
+            <a:r>
+              <a:rPr lang="en-US" dirty="0" smtClean="0">
+                <a:latin typeface="Times New Roman" panose="02020603050405020304" pitchFamily="18" charset="0"/>
+                <a:cs typeface="Times New Roman" panose="02020603050405020304" pitchFamily="18" charset="0"/>
+              </a:rPr>
+              <a:t>) - </a:t>
+            </a:r>
+            <a:r>
+              <a:rPr lang="en-US" dirty="0" err="1" smtClean="0">
+                <a:latin typeface="Times New Roman" panose="02020603050405020304" pitchFamily="18" charset="0"/>
+                <a:cs typeface="Times New Roman" panose="02020603050405020304" pitchFamily="18" charset="0"/>
+              </a:rPr>
+              <a:t>CsIV</a:t>
+            </a:r>
+            <a:r>
+              <a:rPr lang="en-US" dirty="0" smtClean="0">
+                <a:latin typeface="Times New Roman" panose="02020603050405020304" pitchFamily="18" charset="0"/>
+                <a:cs typeface="Times New Roman" panose="02020603050405020304" pitchFamily="18" charset="0"/>
+              </a:rPr>
+              <a:t> ;</a:t>
+            </a:r>
+          </a:p>
+          <a:p>
             <a:endParaRPr lang="en-US" dirty="0" smtClean="0">
               <a:latin typeface="Times New Roman" panose="02020603050405020304" pitchFamily="18" charset="0"/>
               <a:cs typeface="Times New Roman" panose="02020603050405020304" pitchFamily="18" charset="0"/>
@@ -15721,233 +15978,14 @@
                 <a:latin typeface="Times New Roman" panose="02020603050405020304" pitchFamily="18" charset="0"/>
                 <a:cs typeface="Times New Roman" panose="02020603050405020304" pitchFamily="18" charset="0"/>
               </a:rPr>
-              <a:t>●  </a:t>
+              <a:t>● </a:t>
             </a:r>
             <a:r>
               <a:rPr lang="en-US" dirty="0" smtClean="0">
                 <a:latin typeface="Times New Roman" panose="02020603050405020304" pitchFamily="18" charset="0"/>
                 <a:cs typeface="Times New Roman" panose="02020603050405020304" pitchFamily="18" charset="0"/>
               </a:rPr>
-              <a:t>For errors of voltage: </a:t>
-            </a:r>
-          </a:p>
-          <a:p>
-            <a:r>
-              <a:rPr lang="en-US" dirty="0">
-                <a:latin typeface="Times New Roman" panose="02020603050405020304" pitchFamily="18" charset="0"/>
-                <a:cs typeface="Times New Roman" panose="02020603050405020304" pitchFamily="18" charset="0"/>
-              </a:rPr>
-              <a:t> </a:t>
-            </a:r>
-            <a:r>
-              <a:rPr lang="en-US" dirty="0" smtClean="0">
-                <a:latin typeface="Times New Roman" panose="02020603050405020304" pitchFamily="18" charset="0"/>
-                <a:cs typeface="Times New Roman" panose="02020603050405020304" pitchFamily="18" charset="0"/>
-              </a:rPr>
-              <a:t>       </a:t>
-            </a:r>
-            <a:r>
-              <a:rPr lang="en-US" dirty="0" err="1" smtClean="0">
-                <a:latin typeface="Times New Roman" panose="02020603050405020304" pitchFamily="18" charset="0"/>
-                <a:cs typeface="Times New Roman" panose="02020603050405020304" pitchFamily="18" charset="0"/>
-              </a:rPr>
-              <a:t>CsIV</a:t>
-            </a:r>
-            <a:r>
-              <a:rPr lang="en-US" dirty="0" smtClean="0">
-                <a:latin typeface="Times New Roman" panose="02020603050405020304" pitchFamily="18" charset="0"/>
-                <a:cs typeface="Times New Roman" panose="02020603050405020304" pitchFamily="18" charset="0"/>
-              </a:rPr>
-              <a:t>       = </a:t>
-            </a:r>
-            <a:r>
-              <a:rPr lang="en-US" dirty="0" err="1" smtClean="0">
-                <a:latin typeface="Times New Roman" panose="02020603050405020304" pitchFamily="18" charset="0"/>
-                <a:cs typeface="Times New Roman" panose="02020603050405020304" pitchFamily="18" charset="0"/>
-              </a:rPr>
-              <a:t>CsICalibrationModule.GetVoltageValue</a:t>
-            </a:r>
-            <a:r>
-              <a:rPr lang="en-US" dirty="0" smtClean="0">
-                <a:latin typeface="Times New Roman" panose="02020603050405020304" pitchFamily="18" charset="0"/>
-                <a:cs typeface="Times New Roman" panose="02020603050405020304" pitchFamily="18" charset="0"/>
-              </a:rPr>
-              <a:t>(</a:t>
-            </a:r>
-            <a:r>
-              <a:rPr lang="en-US" dirty="0" err="1" smtClean="0">
-                <a:latin typeface="Times New Roman" panose="02020603050405020304" pitchFamily="18" charset="0"/>
-                <a:cs typeface="Times New Roman" panose="02020603050405020304" pitchFamily="18" charset="0"/>
-              </a:rPr>
-              <a:t>CsIch</a:t>
-            </a:r>
-            <a:r>
-              <a:rPr lang="en-US" dirty="0" smtClean="0">
-                <a:latin typeface="Times New Roman" panose="02020603050405020304" pitchFamily="18" charset="0"/>
-                <a:cs typeface="Times New Roman" panose="02020603050405020304" pitchFamily="18" charset="0"/>
-              </a:rPr>
-              <a:t>, </a:t>
-            </a:r>
-            <a:r>
-              <a:rPr lang="en-US" dirty="0" err="1" smtClean="0">
-                <a:latin typeface="Times New Roman" panose="02020603050405020304" pitchFamily="18" charset="0"/>
-                <a:cs typeface="Times New Roman" panose="02020603050405020304" pitchFamily="18" charset="0"/>
-              </a:rPr>
-              <a:t>telnum</a:t>
-            </a:r>
-            <a:r>
-              <a:rPr lang="en-US" dirty="0" smtClean="0">
-                <a:latin typeface="Times New Roman" panose="02020603050405020304" pitchFamily="18" charset="0"/>
-                <a:cs typeface="Times New Roman" panose="02020603050405020304" pitchFamily="18" charset="0"/>
-              </a:rPr>
-              <a:t>, </a:t>
-            </a:r>
-            <a:r>
-              <a:rPr lang="en-US" dirty="0" err="1" smtClean="0">
-                <a:latin typeface="Times New Roman" panose="02020603050405020304" pitchFamily="18" charset="0"/>
-                <a:cs typeface="Times New Roman" panose="02020603050405020304" pitchFamily="18" charset="0"/>
-              </a:rPr>
-              <a:t>csinum</a:t>
-            </a:r>
-            <a:r>
-              <a:rPr lang="en-US" dirty="0" smtClean="0">
-                <a:latin typeface="Times New Roman" panose="02020603050405020304" pitchFamily="18" charset="0"/>
-                <a:cs typeface="Times New Roman" panose="02020603050405020304" pitchFamily="18" charset="0"/>
-              </a:rPr>
-              <a:t>);</a:t>
-            </a:r>
-          </a:p>
-          <a:p>
-            <a:r>
-              <a:rPr lang="en-US" dirty="0">
-                <a:latin typeface="Times New Roman" panose="02020603050405020304" pitchFamily="18" charset="0"/>
-                <a:cs typeface="Times New Roman" panose="02020603050405020304" pitchFamily="18" charset="0"/>
-              </a:rPr>
-              <a:t> </a:t>
-            </a:r>
-            <a:r>
-              <a:rPr lang="en-US" dirty="0" smtClean="0">
-                <a:latin typeface="Times New Roman" panose="02020603050405020304" pitchFamily="18" charset="0"/>
-                <a:cs typeface="Times New Roman" panose="02020603050405020304" pitchFamily="18" charset="0"/>
-              </a:rPr>
-              <a:t>       </a:t>
-            </a:r>
-            <a:r>
-              <a:rPr lang="en-US" dirty="0" err="1" smtClean="0">
-                <a:latin typeface="Times New Roman" panose="02020603050405020304" pitchFamily="18" charset="0"/>
-                <a:cs typeface="Times New Roman" panose="02020603050405020304" pitchFamily="18" charset="0"/>
-              </a:rPr>
-              <a:t>err_CsIV</a:t>
-            </a:r>
-            <a:r>
-              <a:rPr lang="en-US" dirty="0" smtClean="0">
-                <a:latin typeface="Times New Roman" panose="02020603050405020304" pitchFamily="18" charset="0"/>
-                <a:cs typeface="Times New Roman" panose="02020603050405020304" pitchFamily="18" charset="0"/>
-              </a:rPr>
-              <a:t> = </a:t>
-            </a:r>
-            <a:r>
-              <a:rPr lang="en-US" dirty="0" err="1" smtClean="0">
-                <a:latin typeface="Times New Roman" panose="02020603050405020304" pitchFamily="18" charset="0"/>
-                <a:cs typeface="Times New Roman" panose="02020603050405020304" pitchFamily="18" charset="0"/>
-              </a:rPr>
-              <a:t>CsICalibrationModule.GetVoltageValue</a:t>
-            </a:r>
-            <a:r>
-              <a:rPr lang="en-US" dirty="0" smtClean="0">
-                <a:latin typeface="Times New Roman" panose="02020603050405020304" pitchFamily="18" charset="0"/>
-                <a:cs typeface="Times New Roman" panose="02020603050405020304" pitchFamily="18" charset="0"/>
-              </a:rPr>
-              <a:t>(</a:t>
-            </a:r>
-            <a:r>
-              <a:rPr lang="en-US" dirty="0" err="1" smtClean="0">
-                <a:latin typeface="Times New Roman" panose="02020603050405020304" pitchFamily="18" charset="0"/>
-                <a:cs typeface="Times New Roman" panose="02020603050405020304" pitchFamily="18" charset="0"/>
-              </a:rPr>
-              <a:t>CsIch+err_CsIch</a:t>
-            </a:r>
-            <a:r>
-              <a:rPr lang="en-US" dirty="0" smtClean="0">
-                <a:latin typeface="Times New Roman" panose="02020603050405020304" pitchFamily="18" charset="0"/>
-                <a:cs typeface="Times New Roman" panose="02020603050405020304" pitchFamily="18" charset="0"/>
-              </a:rPr>
-              <a:t>, </a:t>
-            </a:r>
-            <a:r>
-              <a:rPr lang="en-US" dirty="0" err="1" smtClean="0">
-                <a:latin typeface="Times New Roman" panose="02020603050405020304" pitchFamily="18" charset="0"/>
-                <a:cs typeface="Times New Roman" panose="02020603050405020304" pitchFamily="18" charset="0"/>
-              </a:rPr>
-              <a:t>telnum</a:t>
-            </a:r>
-            <a:r>
-              <a:rPr lang="en-US" dirty="0" smtClean="0">
-                <a:latin typeface="Times New Roman" panose="02020603050405020304" pitchFamily="18" charset="0"/>
-                <a:cs typeface="Times New Roman" panose="02020603050405020304" pitchFamily="18" charset="0"/>
-              </a:rPr>
-              <a:t>, </a:t>
-            </a:r>
-            <a:r>
-              <a:rPr lang="en-US" dirty="0" err="1" smtClean="0">
-                <a:latin typeface="Times New Roman" panose="02020603050405020304" pitchFamily="18" charset="0"/>
-                <a:cs typeface="Times New Roman" panose="02020603050405020304" pitchFamily="18" charset="0"/>
-              </a:rPr>
-              <a:t>csinum</a:t>
-            </a:r>
-            <a:r>
-              <a:rPr lang="en-US" dirty="0" smtClean="0">
-                <a:latin typeface="Times New Roman" panose="02020603050405020304" pitchFamily="18" charset="0"/>
-                <a:cs typeface="Times New Roman" panose="02020603050405020304" pitchFamily="18" charset="0"/>
-              </a:rPr>
-              <a:t>) - </a:t>
-            </a:r>
-            <a:r>
-              <a:rPr lang="en-US" dirty="0" err="1" smtClean="0">
-                <a:latin typeface="Times New Roman" panose="02020603050405020304" pitchFamily="18" charset="0"/>
-                <a:cs typeface="Times New Roman" panose="02020603050405020304" pitchFamily="18" charset="0"/>
-              </a:rPr>
-              <a:t>CsIV</a:t>
-            </a:r>
-            <a:r>
-              <a:rPr lang="en-US" dirty="0" smtClean="0">
-                <a:latin typeface="Times New Roman" panose="02020603050405020304" pitchFamily="18" charset="0"/>
-                <a:cs typeface="Times New Roman" panose="02020603050405020304" pitchFamily="18" charset="0"/>
-              </a:rPr>
-              <a:t> ;</a:t>
-            </a:r>
-          </a:p>
-          <a:p>
-            <a:endParaRPr lang="en-US" dirty="0" smtClean="0">
-              <a:latin typeface="Times New Roman" panose="02020603050405020304" pitchFamily="18" charset="0"/>
-              <a:cs typeface="Times New Roman" panose="02020603050405020304" pitchFamily="18" charset="0"/>
-            </a:endParaRPr>
-          </a:p>
-          <a:p>
-            <a:r>
-              <a:rPr lang="en-US" dirty="0"/>
-              <a:t> </a:t>
-            </a:r>
-            <a:r>
-              <a:rPr lang="en-US" dirty="0">
-                <a:latin typeface="Times New Roman" panose="02020603050405020304" pitchFamily="18" charset="0"/>
-                <a:cs typeface="Times New Roman" panose="02020603050405020304" pitchFamily="18" charset="0"/>
-              </a:rPr>
-              <a:t>● </a:t>
-            </a:r>
-            <a:r>
-              <a:rPr lang="en-US" dirty="0" smtClean="0">
-                <a:latin typeface="Times New Roman" panose="02020603050405020304" pitchFamily="18" charset="0"/>
-                <a:cs typeface="Times New Roman" panose="02020603050405020304" pitchFamily="18" charset="0"/>
-              </a:rPr>
-              <a:t> For </a:t>
-            </a:r>
-            <a:r>
-              <a:rPr lang="en-US" dirty="0" smtClean="0">
-                <a:latin typeface="Times New Roman" panose="02020603050405020304" pitchFamily="18" charset="0"/>
-                <a:cs typeface="Times New Roman" panose="02020603050405020304" pitchFamily="18" charset="0"/>
-              </a:rPr>
-              <a:t>Gaussian fit</a:t>
+              <a:t> For Gaussian fit</a:t>
             </a:r>
           </a:p>
           <a:p>

</xml_diff>

<commit_message>
finished punch through points.
</commit_message>
<xml_diff>
--- a/2018Oct-Tutorial_HiRACsICalibrations.pptx
+++ b/2018Oct-Tutorial_HiRACsICalibrations.pptx
@@ -5,7 +5,7 @@
     <p:sldMasterId id="2147483648" r:id="rId1"/>
   </p:sldMasterIdLst>
   <p:notesMasterIdLst>
-    <p:notesMasterId r:id="rId50"/>
+    <p:notesMasterId r:id="rId48"/>
   </p:notesMasterIdLst>
   <p:sldIdLst>
     <p:sldId id="256" r:id="rId2"/>
@@ -42,20 +42,18 @@
     <p:sldId id="260" r:id="rId33"/>
     <p:sldId id="261" r:id="rId34"/>
     <p:sldId id="298" r:id="rId35"/>
-    <p:sldId id="299" r:id="rId36"/>
-    <p:sldId id="300" r:id="rId37"/>
-    <p:sldId id="262" r:id="rId38"/>
-    <p:sldId id="270" r:id="rId39"/>
-    <p:sldId id="263" r:id="rId40"/>
-    <p:sldId id="264" r:id="rId41"/>
-    <p:sldId id="271" r:id="rId42"/>
-    <p:sldId id="272" r:id="rId43"/>
-    <p:sldId id="273" r:id="rId44"/>
-    <p:sldId id="274" r:id="rId45"/>
-    <p:sldId id="275" r:id="rId46"/>
-    <p:sldId id="276" r:id="rId47"/>
-    <p:sldId id="301" r:id="rId48"/>
-    <p:sldId id="302" r:id="rId49"/>
+    <p:sldId id="262" r:id="rId36"/>
+    <p:sldId id="270" r:id="rId37"/>
+    <p:sldId id="263" r:id="rId38"/>
+    <p:sldId id="264" r:id="rId39"/>
+    <p:sldId id="271" r:id="rId40"/>
+    <p:sldId id="272" r:id="rId41"/>
+    <p:sldId id="273" r:id="rId42"/>
+    <p:sldId id="274" r:id="rId43"/>
+    <p:sldId id="275" r:id="rId44"/>
+    <p:sldId id="276" r:id="rId45"/>
+    <p:sldId id="301" r:id="rId46"/>
+    <p:sldId id="302" r:id="rId47"/>
   </p:sldIdLst>
   <p:sldSz cx="12192000" cy="6858000"/>
   <p:notesSz cx="6858000" cy="9144000"/>
@@ -244,7 +242,7 @@
           <a:p>
             <a:fld id="{56884FD5-078F-452E-9E34-3872B0A18C88}" type="datetimeFigureOut">
               <a:rPr lang="en-US" smtClean="0"/>
-              <a:t>10/25/2018</a:t>
+              <a:t>10/29/2018</a:t>
             </a:fld>
             <a:endParaRPr lang="en-US"/>
           </a:p>
@@ -596,6 +594,90 @@
 </p:notes>
 </file>
 
+<file path=ppt/notesSlides/notesSlide2.xml><?xml version="1.0" encoding="utf-8"?>
+<p:notes xmlns:a="http://schemas.openxmlformats.org/drawingml/2006/main" xmlns:r="http://schemas.openxmlformats.org/officeDocument/2006/relationships" xmlns:p="http://schemas.openxmlformats.org/presentationml/2006/main">
+  <p:cSld>
+    <p:spTree>
+      <p:nvGrpSpPr>
+        <p:cNvPr id="1" name=""/>
+        <p:cNvGrpSpPr/>
+        <p:nvPr/>
+      </p:nvGrpSpPr>
+      <p:grpSpPr>
+        <a:xfrm>
+          <a:off x="0" y="0"/>
+          <a:ext cx="0" cy="0"/>
+          <a:chOff x="0" y="0"/>
+          <a:chExt cx="0" cy="0"/>
+        </a:xfrm>
+      </p:grpSpPr>
+      <p:sp>
+        <p:nvSpPr>
+          <p:cNvPr id="2" name="Slide Image Placeholder 1"/>
+          <p:cNvSpPr>
+            <a:spLocks noGrp="1" noRot="1" noChangeAspect="1"/>
+          </p:cNvSpPr>
+          <p:nvPr>
+            <p:ph type="sldImg"/>
+          </p:nvPr>
+        </p:nvSpPr>
+        <p:spPr/>
+      </p:sp>
+      <p:sp>
+        <p:nvSpPr>
+          <p:cNvPr id="3" name="Notes Placeholder 2"/>
+          <p:cNvSpPr>
+            <a:spLocks noGrp="1"/>
+          </p:cNvSpPr>
+          <p:nvPr>
+            <p:ph type="body" idx="1"/>
+          </p:nvPr>
+        </p:nvSpPr>
+        <p:spPr/>
+        <p:txBody>
+          <a:bodyPr/>
+          <a:lstStyle/>
+          <a:p>
+            <a:endParaRPr lang="en-US"/>
+          </a:p>
+        </p:txBody>
+      </p:sp>
+      <p:sp>
+        <p:nvSpPr>
+          <p:cNvPr id="4" name="Slide Number Placeholder 3"/>
+          <p:cNvSpPr>
+            <a:spLocks noGrp="1"/>
+          </p:cNvSpPr>
+          <p:nvPr>
+            <p:ph type="sldNum" sz="quarter" idx="10"/>
+          </p:nvPr>
+        </p:nvSpPr>
+        <p:spPr/>
+        <p:txBody>
+          <a:bodyPr/>
+          <a:lstStyle/>
+          <a:p>
+            <a:fld id="{47FBAA53-6A34-431E-B8E9-25A409D958DC}" type="slidenum">
+              <a:rPr lang="en-US" smtClean="0"/>
+              <a:t>34</a:t>
+            </a:fld>
+            <a:endParaRPr lang="en-US"/>
+          </a:p>
+        </p:txBody>
+      </p:sp>
+    </p:spTree>
+    <p:extLst>
+      <p:ext uri="{BB962C8B-B14F-4D97-AF65-F5344CB8AC3E}">
+        <p14:creationId xmlns:p14="http://schemas.microsoft.com/office/powerpoint/2010/main" val="2669563969"/>
+      </p:ext>
+    </p:extLst>
+  </p:cSld>
+  <p:clrMapOvr>
+    <a:masterClrMapping/>
+  </p:clrMapOvr>
+</p:notes>
+</file>
+
 <file path=ppt/slideLayouts/slideLayout1.xml><?xml version="1.0" encoding="utf-8"?>
 <p:sldLayout xmlns:a="http://schemas.openxmlformats.org/drawingml/2006/main" xmlns:r="http://schemas.openxmlformats.org/officeDocument/2006/relationships" xmlns:p="http://schemas.openxmlformats.org/presentationml/2006/main" type="title" preserve="1">
   <p:cSld name="Title Slide">
@@ -727,7 +809,7 @@
           <a:p>
             <a:fld id="{2AB85655-92EE-4FFE-AD52-8C3D789CC0B5}" type="datetimeFigureOut">
               <a:rPr lang="en-US" smtClean="0"/>
-              <a:t>10/25/2018</a:t>
+              <a:t>10/29/2018</a:t>
             </a:fld>
             <a:endParaRPr lang="en-US"/>
           </a:p>
@@ -897,7 +979,7 @@
           <a:p>
             <a:fld id="{2AB85655-92EE-4FFE-AD52-8C3D789CC0B5}" type="datetimeFigureOut">
               <a:rPr lang="en-US" smtClean="0"/>
-              <a:t>10/25/2018</a:t>
+              <a:t>10/29/2018</a:t>
             </a:fld>
             <a:endParaRPr lang="en-US"/>
           </a:p>
@@ -1077,7 +1159,7 @@
           <a:p>
             <a:fld id="{2AB85655-92EE-4FFE-AD52-8C3D789CC0B5}" type="datetimeFigureOut">
               <a:rPr lang="en-US" smtClean="0"/>
-              <a:t>10/25/2018</a:t>
+              <a:t>10/29/2018</a:t>
             </a:fld>
             <a:endParaRPr lang="en-US"/>
           </a:p>
@@ -1247,7 +1329,7 @@
           <a:p>
             <a:fld id="{2AB85655-92EE-4FFE-AD52-8C3D789CC0B5}" type="datetimeFigureOut">
               <a:rPr lang="en-US" smtClean="0"/>
-              <a:t>10/25/2018</a:t>
+              <a:t>10/29/2018</a:t>
             </a:fld>
             <a:endParaRPr lang="en-US"/>
           </a:p>
@@ -1493,7 +1575,7 @@
           <a:p>
             <a:fld id="{2AB85655-92EE-4FFE-AD52-8C3D789CC0B5}" type="datetimeFigureOut">
               <a:rPr lang="en-US" smtClean="0"/>
-              <a:t>10/25/2018</a:t>
+              <a:t>10/29/2018</a:t>
             </a:fld>
             <a:endParaRPr lang="en-US"/>
           </a:p>
@@ -1725,7 +1807,7 @@
           <a:p>
             <a:fld id="{2AB85655-92EE-4FFE-AD52-8C3D789CC0B5}" type="datetimeFigureOut">
               <a:rPr lang="en-US" smtClean="0"/>
-              <a:t>10/25/2018</a:t>
+              <a:t>10/29/2018</a:t>
             </a:fld>
             <a:endParaRPr lang="en-US"/>
           </a:p>
@@ -2092,7 +2174,7 @@
           <a:p>
             <a:fld id="{2AB85655-92EE-4FFE-AD52-8C3D789CC0B5}" type="datetimeFigureOut">
               <a:rPr lang="en-US" smtClean="0"/>
-              <a:t>10/25/2018</a:t>
+              <a:t>10/29/2018</a:t>
             </a:fld>
             <a:endParaRPr lang="en-US"/>
           </a:p>
@@ -2210,7 +2292,7 @@
           <a:p>
             <a:fld id="{2AB85655-92EE-4FFE-AD52-8C3D789CC0B5}" type="datetimeFigureOut">
               <a:rPr lang="en-US" smtClean="0"/>
-              <a:t>10/25/2018</a:t>
+              <a:t>10/29/2018</a:t>
             </a:fld>
             <a:endParaRPr lang="en-US"/>
           </a:p>
@@ -2305,7 +2387,7 @@
           <a:p>
             <a:fld id="{2AB85655-92EE-4FFE-AD52-8C3D789CC0B5}" type="datetimeFigureOut">
               <a:rPr lang="en-US" smtClean="0"/>
-              <a:t>10/25/2018</a:t>
+              <a:t>10/29/2018</a:t>
             </a:fld>
             <a:endParaRPr lang="en-US"/>
           </a:p>
@@ -2582,7 +2664,7 @@
           <a:p>
             <a:fld id="{2AB85655-92EE-4FFE-AD52-8C3D789CC0B5}" type="datetimeFigureOut">
               <a:rPr lang="en-US" smtClean="0"/>
-              <a:t>10/25/2018</a:t>
+              <a:t>10/29/2018</a:t>
             </a:fld>
             <a:endParaRPr lang="en-US"/>
           </a:p>
@@ -2835,7 +2917,7 @@
           <a:p>
             <a:fld id="{2AB85655-92EE-4FFE-AD52-8C3D789CC0B5}" type="datetimeFigureOut">
               <a:rPr lang="en-US" smtClean="0"/>
-              <a:t>10/25/2018</a:t>
+              <a:t>10/29/2018</a:t>
             </a:fld>
             <a:endParaRPr lang="en-US"/>
           </a:p>
@@ -3048,7 +3130,7 @@
           <a:p>
             <a:fld id="{2AB85655-92EE-4FFE-AD52-8C3D789CC0B5}" type="datetimeFigureOut">
               <a:rPr lang="en-US" smtClean="0"/>
-              <a:t>10/25/2018</a:t>
+              <a:t>10/29/2018</a:t>
             </a:fld>
             <a:endParaRPr lang="en-US"/>
           </a:p>
@@ -12860,7 +12942,7 @@
         </p:nvSpPr>
         <p:spPr>
           <a:xfrm>
-            <a:off x="1733491" y="2257689"/>
+            <a:off x="1597689" y="1986085"/>
             <a:ext cx="8862792" cy="769441"/>
           </a:xfrm>
           <a:prstGeom prst="rect">
@@ -13323,6 +13405,173 @@
           <a:chExt cx="0" cy="0"/>
         </a:xfrm>
       </p:grpSpPr>
+      <p:sp>
+        <p:nvSpPr>
+          <p:cNvPr id="2" name="Rectangle 1"/>
+          <p:cNvSpPr/>
+          <p:nvPr/>
+        </p:nvSpPr>
+        <p:spPr>
+          <a:xfrm>
+            <a:off x="0" y="101708"/>
+            <a:ext cx="4348306" cy="369332"/>
+          </a:xfrm>
+          <a:prstGeom prst="rect">
+            <a:avLst/>
+          </a:prstGeom>
+        </p:spPr>
+        <p:txBody>
+          <a:bodyPr wrap="none">
+            <a:spAutoFit/>
+          </a:bodyPr>
+          <a:lstStyle/>
+          <a:p>
+            <a:r>
+              <a:rPr lang="en-US" b="1" u="sng" dirty="0" smtClean="0">
+                <a:latin typeface="Times New Roman" panose="02020603050405020304" pitchFamily="18" charset="0"/>
+                <a:cs typeface="Times New Roman" panose="02020603050405020304" pitchFamily="18" charset="0"/>
+              </a:rPr>
+              <a:t>Extension: what </a:t>
+            </a:r>
+            <a:r>
+              <a:rPr lang="en-US" b="1" u="sng" dirty="0" smtClean="0">
+                <a:latin typeface="Times New Roman" panose="02020603050405020304" pitchFamily="18" charset="0"/>
+                <a:cs typeface="Times New Roman" panose="02020603050405020304" pitchFamily="18" charset="0"/>
+              </a:rPr>
+              <a:t>is punch through point? </a:t>
+            </a:r>
+            <a:endParaRPr lang="en-US" dirty="0" smtClean="0">
+              <a:solidFill>
+                <a:srgbClr val="FF0000"/>
+              </a:solidFill>
+              <a:latin typeface="Times New Roman" panose="02020603050405020304" pitchFamily="18" charset="0"/>
+              <a:cs typeface="Times New Roman" panose="02020603050405020304" pitchFamily="18" charset="0"/>
+            </a:endParaRPr>
+          </a:p>
+        </p:txBody>
+      </p:sp>
+      <p:sp>
+        <p:nvSpPr>
+          <p:cNvPr id="3" name="TextBox 2"/>
+          <p:cNvSpPr txBox="1"/>
+          <p:nvPr/>
+        </p:nvSpPr>
+        <p:spPr>
+          <a:xfrm>
+            <a:off x="316871" y="905347"/>
+            <a:ext cx="11108602" cy="646331"/>
+          </a:xfrm>
+          <a:prstGeom prst="rect">
+            <a:avLst/>
+          </a:prstGeom>
+          <a:noFill/>
+        </p:spPr>
+        <p:txBody>
+          <a:bodyPr wrap="square" rtlCol="0">
+            <a:spAutoFit/>
+          </a:bodyPr>
+          <a:lstStyle/>
+          <a:p>
+            <a:r>
+              <a:rPr lang="en-US" dirty="0" smtClean="0"/>
+              <a:t>● Punch through means that </a:t>
+            </a:r>
+            <a:r>
+              <a:rPr lang="en-US" b="1" dirty="0" smtClean="0">
+                <a:solidFill>
+                  <a:srgbClr val="00B050"/>
+                </a:solidFill>
+              </a:rPr>
+              <a:t>a particle stops at the end of the material</a:t>
+            </a:r>
+            <a:r>
+              <a:rPr lang="en-US" dirty="0" smtClean="0"/>
+              <a:t>. The energy of this kind of </a:t>
+            </a:r>
+          </a:p>
+          <a:p>
+            <a:r>
+              <a:rPr lang="en-US" dirty="0"/>
+              <a:t> </a:t>
+            </a:r>
+            <a:r>
+              <a:rPr lang="en-US" dirty="0" smtClean="0"/>
+              <a:t>   particle is called punch-through energy. With a little more energy, this particle would fly away.  </a:t>
+            </a:r>
+            <a:endParaRPr lang="en-US" dirty="0"/>
+          </a:p>
+        </p:txBody>
+      </p:sp>
+      <p:sp>
+        <p:nvSpPr>
+          <p:cNvPr id="4" name="TextBox 3"/>
+          <p:cNvSpPr txBox="1"/>
+          <p:nvPr/>
+        </p:nvSpPr>
+        <p:spPr>
+          <a:xfrm>
+            <a:off x="316871" y="1754864"/>
+            <a:ext cx="11108602" cy="646331"/>
+          </a:xfrm>
+          <a:prstGeom prst="rect">
+            <a:avLst/>
+          </a:prstGeom>
+          <a:noFill/>
+        </p:spPr>
+        <p:txBody>
+          <a:bodyPr wrap="square" rtlCol="0">
+            <a:spAutoFit/>
+          </a:bodyPr>
+          <a:lstStyle/>
+          <a:p>
+            <a:r>
+              <a:rPr lang="en-US" dirty="0" smtClean="0"/>
+              <a:t>● It is a similar concept as the range of a charge particle, because the stopping power is known for a </a:t>
+            </a:r>
+          </a:p>
+          <a:p>
+            <a:r>
+              <a:rPr lang="en-US" dirty="0"/>
+              <a:t> </a:t>
+            </a:r>
+            <a:r>
+              <a:rPr lang="en-US" dirty="0" smtClean="0"/>
+              <a:t>  given energy.</a:t>
+            </a:r>
+            <a:endParaRPr lang="en-US" dirty="0"/>
+          </a:p>
+        </p:txBody>
+      </p:sp>
+      <p:pic>
+        <p:nvPicPr>
+          <p:cNvPr id="5" name="Picture 4"/>
+          <p:cNvPicPr>
+            <a:picLocks noChangeAspect="1"/>
+          </p:cNvPicPr>
+          <p:nvPr/>
+        </p:nvPicPr>
+        <p:blipFill>
+          <a:blip r:embed="rId2">
+            <a:extLst>
+              <a:ext uri="{28A0092B-C50C-407E-A947-70E740481C1C}">
+                <a14:useLocalDpi xmlns:a14="http://schemas.microsoft.com/office/drawing/2010/main" val="0"/>
+              </a:ext>
+            </a:extLst>
+          </a:blip>
+          <a:stretch>
+            <a:fillRect/>
+          </a:stretch>
+        </p:blipFill>
+        <p:spPr>
+          <a:xfrm>
+            <a:off x="3548244" y="2401195"/>
+            <a:ext cx="4286543" cy="4149373"/>
+          </a:xfrm>
+          <a:prstGeom prst="rect">
+            <a:avLst/>
+          </a:prstGeom>
+        </p:spPr>
+      </p:pic>
     </p:spTree>
     <p:extLst>
       <p:ext uri="{BB962C8B-B14F-4D97-AF65-F5344CB8AC3E}">
@@ -13353,6 +13602,350 @@
           <a:chExt cx="0" cy="0"/>
         </a:xfrm>
       </p:grpSpPr>
+      <p:sp>
+        <p:nvSpPr>
+          <p:cNvPr id="2" name="Rectangle 1"/>
+          <p:cNvSpPr/>
+          <p:nvPr/>
+        </p:nvSpPr>
+        <p:spPr>
+          <a:xfrm>
+            <a:off x="125179" y="179628"/>
+            <a:ext cx="7428637" cy="923330"/>
+          </a:xfrm>
+          <a:prstGeom prst="rect">
+            <a:avLst/>
+          </a:prstGeom>
+        </p:spPr>
+        <p:txBody>
+          <a:bodyPr wrap="none">
+            <a:spAutoFit/>
+          </a:bodyPr>
+          <a:lstStyle/>
+          <a:p>
+            <a:r>
+              <a:rPr lang="en-US" b="1" u="sng" dirty="0" smtClean="0">
+                <a:latin typeface="Times New Roman" panose="02020603050405020304" pitchFamily="18" charset="0"/>
+                <a:cs typeface="Times New Roman" panose="02020603050405020304" pitchFamily="18" charset="0"/>
+              </a:rPr>
+              <a:t>Step </a:t>
+            </a:r>
+            <a:r>
+              <a:rPr lang="en-US" b="1" u="sng" dirty="0">
+                <a:latin typeface="Times New Roman" panose="02020603050405020304" pitchFamily="18" charset="0"/>
+                <a:cs typeface="Times New Roman" panose="02020603050405020304" pitchFamily="18" charset="0"/>
+              </a:rPr>
+              <a:t>1</a:t>
+            </a:r>
+            <a:r>
+              <a:rPr lang="en-US" b="1" u="sng" dirty="0" smtClean="0">
+                <a:latin typeface="Times New Roman" panose="02020603050405020304" pitchFamily="18" charset="0"/>
+                <a:cs typeface="Times New Roman" panose="02020603050405020304" pitchFamily="18" charset="0"/>
+              </a:rPr>
+              <a:t>:  </a:t>
+            </a:r>
+            <a:r>
+              <a:rPr lang="en-US" b="1" u="sng" dirty="0" smtClean="0">
+                <a:latin typeface="Times New Roman" panose="02020603050405020304" pitchFamily="18" charset="0"/>
+                <a:cs typeface="Times New Roman" panose="02020603050405020304" pitchFamily="18" charset="0"/>
+              </a:rPr>
+              <a:t>To get the punch through points(</a:t>
+            </a:r>
+            <a:r>
+              <a:rPr lang="en-US" b="1" u="sng" dirty="0" smtClean="0">
+                <a:solidFill>
+                  <a:srgbClr val="FF0000"/>
+                </a:solidFill>
+                <a:latin typeface="Times New Roman" panose="02020603050405020304" pitchFamily="18" charset="0"/>
+                <a:cs typeface="Times New Roman" panose="02020603050405020304" pitchFamily="18" charset="0"/>
+              </a:rPr>
+              <a:t>in channel</a:t>
+            </a:r>
+            <a:r>
+              <a:rPr lang="en-US" b="1" u="sng" dirty="0" smtClean="0">
+                <a:latin typeface="Times New Roman" panose="02020603050405020304" pitchFamily="18" charset="0"/>
+                <a:cs typeface="Times New Roman" panose="02020603050405020304" pitchFamily="18" charset="0"/>
+              </a:rPr>
+              <a:t>) for raw data </a:t>
+            </a:r>
+            <a:r>
+              <a:rPr lang="en-US" b="1" u="sng" dirty="0" smtClean="0">
+                <a:latin typeface="Times New Roman" panose="02020603050405020304" pitchFamily="18" charset="0"/>
+                <a:cs typeface="Times New Roman" panose="02020603050405020304" pitchFamily="18" charset="0"/>
+              </a:rPr>
+              <a:t> </a:t>
+            </a:r>
+            <a:endParaRPr lang="en-US" b="1" dirty="0" smtClean="0">
+              <a:solidFill>
+                <a:srgbClr val="81ABFF"/>
+              </a:solidFill>
+              <a:latin typeface="Times New Roman" panose="02020603050405020304" pitchFamily="18" charset="0"/>
+              <a:cs typeface="Times New Roman" panose="02020603050405020304" pitchFamily="18" charset="0"/>
+            </a:endParaRPr>
+          </a:p>
+          <a:p>
+            <a:r>
+              <a:rPr lang="en-US" b="1" dirty="0" smtClean="0">
+                <a:solidFill>
+                  <a:srgbClr val="81ABFF"/>
+                </a:solidFill>
+                <a:latin typeface="Times New Roman" panose="02020603050405020304" pitchFamily="18" charset="0"/>
+                <a:cs typeface="Times New Roman" panose="02020603050405020304" pitchFamily="18" charset="0"/>
+              </a:rPr>
+              <a:t>(</a:t>
+            </a:r>
+            <a:r>
+              <a:rPr lang="en-US" b="1" dirty="0">
+                <a:solidFill>
+                  <a:srgbClr val="81ABFF"/>
+                </a:solidFill>
+                <a:latin typeface="Times New Roman" panose="02020603050405020304" pitchFamily="18" charset="0"/>
+                <a:cs typeface="Times New Roman" panose="02020603050405020304" pitchFamily="18" charset="0"/>
+              </a:rPr>
+              <a:t>macro to be used: 20PunchThroughPoints/</a:t>
+            </a:r>
+            <a:r>
+              <a:rPr lang="en-US" b="1" dirty="0" err="1">
+                <a:solidFill>
+                  <a:srgbClr val="81ABFF"/>
+                </a:solidFill>
+                <a:latin typeface="Times New Roman" panose="02020603050405020304" pitchFamily="18" charset="0"/>
+                <a:cs typeface="Times New Roman" panose="02020603050405020304" pitchFamily="18" charset="0"/>
+              </a:rPr>
+              <a:t>TogetPunchThroughPoints.C</a:t>
+            </a:r>
+            <a:r>
+              <a:rPr lang="en-US" b="1" dirty="0">
+                <a:solidFill>
+                  <a:srgbClr val="81ABFF"/>
+                </a:solidFill>
+                <a:latin typeface="Times New Roman" panose="02020603050405020304" pitchFamily="18" charset="0"/>
+                <a:cs typeface="Times New Roman" panose="02020603050405020304" pitchFamily="18" charset="0"/>
+              </a:rPr>
+              <a:t>)</a:t>
+            </a:r>
+            <a:endParaRPr lang="en-US" altLang="zh-CN" b="1" dirty="0">
+              <a:solidFill>
+                <a:srgbClr val="81ABFF"/>
+              </a:solidFill>
+              <a:latin typeface="Times New Roman" panose="02020603050405020304" pitchFamily="18" charset="0"/>
+              <a:cs typeface="Times New Roman" panose="02020603050405020304" pitchFamily="18" charset="0"/>
+            </a:endParaRPr>
+          </a:p>
+          <a:p>
+            <a:endParaRPr lang="en-US" dirty="0" smtClean="0">
+              <a:solidFill>
+                <a:srgbClr val="FF0000"/>
+              </a:solidFill>
+              <a:latin typeface="Times New Roman" panose="02020603050405020304" pitchFamily="18" charset="0"/>
+              <a:cs typeface="Times New Roman" panose="02020603050405020304" pitchFamily="18" charset="0"/>
+            </a:endParaRPr>
+          </a:p>
+        </p:txBody>
+      </p:sp>
+      <p:sp>
+        <p:nvSpPr>
+          <p:cNvPr id="3" name="TextBox 2"/>
+          <p:cNvSpPr txBox="1"/>
+          <p:nvPr/>
+        </p:nvSpPr>
+        <p:spPr>
+          <a:xfrm>
+            <a:off x="265899" y="965124"/>
+            <a:ext cx="5238430" cy="369332"/>
+          </a:xfrm>
+          <a:prstGeom prst="rect">
+            <a:avLst/>
+          </a:prstGeom>
+          <a:noFill/>
+        </p:spPr>
+        <p:txBody>
+          <a:bodyPr wrap="square" rtlCol="0">
+            <a:spAutoFit/>
+          </a:bodyPr>
+          <a:lstStyle/>
+          <a:p>
+            <a:r>
+              <a:rPr lang="en-US" dirty="0" smtClean="0"/>
+              <a:t>● </a:t>
+            </a:r>
+            <a:r>
+              <a:rPr lang="en-US" b="1" dirty="0" smtClean="0"/>
+              <a:t>With the ∆E-E spectra, make projection to X axis</a:t>
+            </a:r>
+            <a:endParaRPr lang="en-US" b="1" dirty="0"/>
+          </a:p>
+        </p:txBody>
+      </p:sp>
+      <p:pic>
+        <p:nvPicPr>
+          <p:cNvPr id="4" name="Picture 3"/>
+          <p:cNvPicPr>
+            <a:picLocks noChangeAspect="1"/>
+          </p:cNvPicPr>
+          <p:nvPr/>
+        </p:nvPicPr>
+        <p:blipFill>
+          <a:blip r:embed="rId2"/>
+          <a:stretch>
+            <a:fillRect/>
+          </a:stretch>
+        </p:blipFill>
+        <p:spPr>
+          <a:xfrm>
+            <a:off x="599107" y="1721220"/>
+            <a:ext cx="4582824" cy="3334297"/>
+          </a:xfrm>
+          <a:prstGeom prst="rect">
+            <a:avLst/>
+          </a:prstGeom>
+        </p:spPr>
+      </p:pic>
+      <p:pic>
+        <p:nvPicPr>
+          <p:cNvPr id="5" name="Picture 4"/>
+          <p:cNvPicPr>
+            <a:picLocks noChangeAspect="1"/>
+          </p:cNvPicPr>
+          <p:nvPr/>
+        </p:nvPicPr>
+        <p:blipFill>
+          <a:blip r:embed="rId3"/>
+          <a:stretch>
+            <a:fillRect/>
+          </a:stretch>
+        </p:blipFill>
+        <p:spPr>
+          <a:xfrm>
+            <a:off x="7699550" y="108642"/>
+            <a:ext cx="3057644" cy="2082297"/>
+          </a:xfrm>
+          <a:prstGeom prst="rect">
+            <a:avLst/>
+          </a:prstGeom>
+        </p:spPr>
+      </p:pic>
+      <p:pic>
+        <p:nvPicPr>
+          <p:cNvPr id="6" name="Picture 5"/>
+          <p:cNvPicPr>
+            <a:picLocks noChangeAspect="1"/>
+          </p:cNvPicPr>
+          <p:nvPr/>
+        </p:nvPicPr>
+        <p:blipFill>
+          <a:blip r:embed="rId4"/>
+          <a:stretch>
+            <a:fillRect/>
+          </a:stretch>
+        </p:blipFill>
+        <p:spPr>
+          <a:xfrm>
+            <a:off x="7602302" y="2243856"/>
+            <a:ext cx="3252140" cy="2289027"/>
+          </a:xfrm>
+          <a:prstGeom prst="rect">
+            <a:avLst/>
+          </a:prstGeom>
+        </p:spPr>
+      </p:pic>
+      <p:pic>
+        <p:nvPicPr>
+          <p:cNvPr id="7" name="Picture 6"/>
+          <p:cNvPicPr>
+            <a:picLocks noChangeAspect="1"/>
+          </p:cNvPicPr>
+          <p:nvPr/>
+        </p:nvPicPr>
+        <p:blipFill>
+          <a:blip r:embed="rId5"/>
+          <a:stretch>
+            <a:fillRect/>
+          </a:stretch>
+        </p:blipFill>
+        <p:spPr>
+          <a:xfrm>
+            <a:off x="7702441" y="4532883"/>
+            <a:ext cx="3232677" cy="2205618"/>
+          </a:xfrm>
+          <a:prstGeom prst="rect">
+            <a:avLst/>
+          </a:prstGeom>
+        </p:spPr>
+      </p:pic>
+      <p:sp>
+        <p:nvSpPr>
+          <p:cNvPr id="8" name="Right Arrow 7"/>
+          <p:cNvSpPr/>
+          <p:nvPr/>
+        </p:nvSpPr>
+        <p:spPr>
+          <a:xfrm>
+            <a:off x="5418895" y="2845160"/>
+            <a:ext cx="1946442" cy="525101"/>
+          </a:xfrm>
+          <a:prstGeom prst="rightArrow">
+            <a:avLst/>
+          </a:prstGeom>
+        </p:spPr>
+        <p:style>
+          <a:lnRef idx="2">
+            <a:schemeClr val="accent1">
+              <a:shade val="50000"/>
+            </a:schemeClr>
+          </a:lnRef>
+          <a:fillRef idx="1">
+            <a:schemeClr val="accent1"/>
+          </a:fillRef>
+          <a:effectRef idx="0">
+            <a:schemeClr val="accent1"/>
+          </a:effectRef>
+          <a:fontRef idx="minor">
+            <a:schemeClr val="lt1"/>
+          </a:fontRef>
+        </p:style>
+        <p:txBody>
+          <a:bodyPr rtlCol="0" anchor="ctr"/>
+          <a:lstStyle/>
+          <a:p>
+            <a:pPr algn="ctr"/>
+            <a:endParaRPr lang="en-US"/>
+          </a:p>
+        </p:txBody>
+      </p:sp>
+      <p:sp>
+        <p:nvSpPr>
+          <p:cNvPr id="9" name="Rectangle 8"/>
+          <p:cNvSpPr/>
+          <p:nvPr/>
+        </p:nvSpPr>
+        <p:spPr>
+          <a:xfrm>
+            <a:off x="5734179" y="2565323"/>
+            <a:ext cx="1315873" cy="369332"/>
+          </a:xfrm>
+          <a:prstGeom prst="rect">
+            <a:avLst/>
+          </a:prstGeom>
+        </p:spPr>
+        <p:txBody>
+          <a:bodyPr wrap="none">
+            <a:spAutoFit/>
+          </a:bodyPr>
+          <a:lstStyle/>
+          <a:p>
+            <a:r>
+              <a:rPr lang="en-US" dirty="0" err="1" smtClean="0"/>
+              <a:t>ProjectionX</a:t>
+            </a:r>
+            <a:r>
+              <a:rPr lang="en-US" dirty="0" smtClean="0"/>
+              <a:t> </a:t>
+            </a:r>
+            <a:endParaRPr lang="en-US" dirty="0"/>
+          </a:p>
+        </p:txBody>
+      </p:sp>
     </p:spTree>
     <p:extLst>
       <p:ext uri="{BB962C8B-B14F-4D97-AF65-F5344CB8AC3E}">
@@ -13383,6 +13976,1278 @@
           <a:chExt cx="0" cy="0"/>
         </a:xfrm>
       </p:grpSpPr>
+      <p:sp>
+        <p:nvSpPr>
+          <p:cNvPr id="2" name="TextBox 1"/>
+          <p:cNvSpPr txBox="1"/>
+          <p:nvPr/>
+        </p:nvSpPr>
+        <p:spPr>
+          <a:xfrm>
+            <a:off x="208229" y="289711"/>
+            <a:ext cx="4916032" cy="369332"/>
+          </a:xfrm>
+          <a:prstGeom prst="rect">
+            <a:avLst/>
+          </a:prstGeom>
+          <a:noFill/>
+        </p:spPr>
+        <p:txBody>
+          <a:bodyPr wrap="square" rtlCol="0">
+            <a:spAutoFit/>
+          </a:bodyPr>
+          <a:lstStyle/>
+          <a:p>
+            <a:r>
+              <a:rPr lang="en-US" dirty="0" smtClean="0"/>
+              <a:t>● </a:t>
+            </a:r>
+            <a:r>
+              <a:rPr lang="en-US" b="1" dirty="0" smtClean="0"/>
+              <a:t>Fit with Fermi Function.</a:t>
+            </a:r>
+            <a:endParaRPr lang="en-US" b="1" dirty="0"/>
+          </a:p>
+        </p:txBody>
+      </p:sp>
+      <p:pic>
+        <p:nvPicPr>
+          <p:cNvPr id="3" name="Picture 2"/>
+          <p:cNvPicPr>
+            <a:picLocks noChangeAspect="1"/>
+          </p:cNvPicPr>
+          <p:nvPr/>
+        </p:nvPicPr>
+        <p:blipFill>
+          <a:blip r:embed="rId2"/>
+          <a:stretch>
+            <a:fillRect/>
+          </a:stretch>
+        </p:blipFill>
+        <p:spPr>
+          <a:xfrm>
+            <a:off x="5765158" y="1434445"/>
+            <a:ext cx="6008152" cy="4304685"/>
+          </a:xfrm>
+          <a:prstGeom prst="rect">
+            <a:avLst/>
+          </a:prstGeom>
+        </p:spPr>
+      </p:pic>
+      <p:sp>
+        <p:nvSpPr>
+          <p:cNvPr id="4" name="TextBox 3"/>
+          <p:cNvSpPr txBox="1"/>
+          <p:nvPr/>
+        </p:nvSpPr>
+        <p:spPr>
+          <a:xfrm rot="16200000">
+            <a:off x="8380928" y="3110577"/>
+            <a:ext cx="2024913" cy="276999"/>
+          </a:xfrm>
+          <a:prstGeom prst="rect">
+            <a:avLst/>
+          </a:prstGeom>
+          <a:noFill/>
+        </p:spPr>
+        <p:txBody>
+          <a:bodyPr wrap="none" rtlCol="0">
+            <a:spAutoFit/>
+          </a:bodyPr>
+          <a:lstStyle/>
+          <a:p>
+            <a:r>
+              <a:rPr lang="en-US" sz="1200" b="1" dirty="0" smtClean="0">
+                <a:solidFill>
+                  <a:srgbClr val="FF0000"/>
+                </a:solidFill>
+              </a:rPr>
+              <a:t>Current punch through point</a:t>
+            </a:r>
+            <a:endParaRPr lang="en-US" sz="1200" b="1" dirty="0">
+              <a:solidFill>
+                <a:srgbClr val="FF0000"/>
+              </a:solidFill>
+            </a:endParaRPr>
+          </a:p>
+        </p:txBody>
+      </p:sp>
+      <p:sp>
+        <p:nvSpPr>
+          <p:cNvPr id="5" name="TextBox 4"/>
+          <p:cNvSpPr txBox="1"/>
+          <p:nvPr/>
+        </p:nvSpPr>
+        <p:spPr>
+          <a:xfrm rot="16200000">
+            <a:off x="8694721" y="3624240"/>
+            <a:ext cx="1905330" cy="276999"/>
+          </a:xfrm>
+          <a:prstGeom prst="rect">
+            <a:avLst/>
+          </a:prstGeom>
+          <a:noFill/>
+        </p:spPr>
+        <p:txBody>
+          <a:bodyPr wrap="none" rtlCol="0">
+            <a:spAutoFit/>
+          </a:bodyPr>
+          <a:lstStyle/>
+          <a:p>
+            <a:r>
+              <a:rPr lang="en-US" sz="1200" b="1" dirty="0" smtClean="0">
+                <a:solidFill>
+                  <a:srgbClr val="FF0000"/>
+                </a:solidFill>
+              </a:rPr>
+              <a:t>Prediction via </a:t>
+            </a:r>
+            <a:r>
+              <a:rPr lang="en-US" sz="1200" b="1" dirty="0" err="1" smtClean="0">
+                <a:solidFill>
+                  <a:srgbClr val="FF0000"/>
+                </a:solidFill>
+              </a:rPr>
+              <a:t>exrapolation</a:t>
+            </a:r>
+            <a:endParaRPr lang="en-US" sz="1200" b="1" dirty="0">
+              <a:solidFill>
+                <a:srgbClr val="FF0000"/>
+              </a:solidFill>
+            </a:endParaRPr>
+          </a:p>
+        </p:txBody>
+      </p:sp>
+      <mc:AlternateContent xmlns:mc="http://schemas.openxmlformats.org/markup-compatibility/2006">
+        <mc:Choice xmlns:a14="http://schemas.microsoft.com/office/drawing/2010/main" Requires="a14">
+          <p:sp>
+            <p:nvSpPr>
+              <p:cNvPr id="6" name="TextBox 5"/>
+              <p:cNvSpPr txBox="1"/>
+              <p:nvPr/>
+            </p:nvSpPr>
+            <p:spPr>
+              <a:xfrm>
+                <a:off x="144855" y="773843"/>
+                <a:ext cx="3603279" cy="588174"/>
+              </a:xfrm>
+              <a:prstGeom prst="rect">
+                <a:avLst/>
+              </a:prstGeom>
+              <a:noFill/>
+            </p:spPr>
+            <p:txBody>
+              <a:bodyPr wrap="square" rtlCol="0">
+                <a:spAutoFit/>
+              </a:bodyPr>
+              <a:lstStyle/>
+              <a:p>
+                <a14:m>
+                  <m:oMathPara xmlns:m="http://schemas.openxmlformats.org/officeDocument/2006/math">
+                    <m:oMathParaPr>
+                      <m:jc m:val="centerGroup"/>
+                    </m:oMathParaPr>
+                    <m:oMath xmlns:m="http://schemas.openxmlformats.org/officeDocument/2006/math">
+                      <m:r>
+                        <a:rPr lang="en-US" b="0" i="1" smtClean="0">
+                          <a:latin typeface="Cambria Math" panose="02040503050406030204" pitchFamily="18" charset="0"/>
+                        </a:rPr>
+                        <m:t>𝑓</m:t>
+                      </m:r>
+                      <m:d>
+                        <m:dPr>
+                          <m:ctrlPr>
+                            <a:rPr lang="en-US" b="0" i="1" smtClean="0">
+                              <a:latin typeface="Cambria Math" panose="02040503050406030204" pitchFamily="18" charset="0"/>
+                            </a:rPr>
+                          </m:ctrlPr>
+                        </m:dPr>
+                        <m:e>
+                          <m:r>
+                            <a:rPr lang="en-US" b="0" i="1" smtClean="0">
+                              <a:latin typeface="Cambria Math" panose="02040503050406030204" pitchFamily="18" charset="0"/>
+                            </a:rPr>
+                            <m:t>𝐸</m:t>
+                          </m:r>
+                        </m:e>
+                      </m:d>
+                      <m:r>
+                        <a:rPr lang="en-US" b="0" i="1" smtClean="0">
+                          <a:latin typeface="Cambria Math" panose="02040503050406030204" pitchFamily="18" charset="0"/>
+                        </a:rPr>
+                        <m:t>=</m:t>
+                      </m:r>
+                      <m:sSub>
+                        <m:sSubPr>
+                          <m:ctrlPr>
+                            <a:rPr lang="en-US" b="0" i="1" smtClean="0">
+                              <a:latin typeface="Cambria Math" panose="02040503050406030204" pitchFamily="18" charset="0"/>
+                            </a:rPr>
+                          </m:ctrlPr>
+                        </m:sSubPr>
+                        <m:e>
+                          <m:r>
+                            <a:rPr lang="en-US" b="0" i="1" smtClean="0">
+                              <a:latin typeface="Cambria Math" panose="02040503050406030204" pitchFamily="18" charset="0"/>
+                            </a:rPr>
+                            <m:t>𝑎</m:t>
+                          </m:r>
+                        </m:e>
+                        <m:sub>
+                          <m:r>
+                            <a:rPr lang="en-US" b="0" i="1" smtClean="0">
+                              <a:latin typeface="Cambria Math" panose="02040503050406030204" pitchFamily="18" charset="0"/>
+                            </a:rPr>
+                            <m:t>3</m:t>
+                          </m:r>
+                        </m:sub>
+                      </m:sSub>
+                      <m:r>
+                        <a:rPr lang="en-US" b="0" i="1" smtClean="0">
+                          <a:latin typeface="Cambria Math" panose="02040503050406030204" pitchFamily="18" charset="0"/>
+                        </a:rPr>
+                        <m:t>+</m:t>
+                      </m:r>
+                      <m:f>
+                        <m:fPr>
+                          <m:ctrlPr>
+                            <a:rPr lang="en-US" b="0" i="1" smtClean="0">
+                              <a:latin typeface="Cambria Math" panose="02040503050406030204" pitchFamily="18" charset="0"/>
+                            </a:rPr>
+                          </m:ctrlPr>
+                        </m:fPr>
+                        <m:num>
+                          <m:sSub>
+                            <m:sSubPr>
+                              <m:ctrlPr>
+                                <a:rPr lang="en-US" b="0" i="1" smtClean="0">
+                                  <a:latin typeface="Cambria Math" panose="02040503050406030204" pitchFamily="18" charset="0"/>
+                                </a:rPr>
+                              </m:ctrlPr>
+                            </m:sSubPr>
+                            <m:e>
+                              <m:r>
+                                <a:rPr lang="en-US" b="0" i="1" smtClean="0">
+                                  <a:latin typeface="Cambria Math" panose="02040503050406030204" pitchFamily="18" charset="0"/>
+                                </a:rPr>
+                                <m:t>𝑎</m:t>
+                              </m:r>
+                            </m:e>
+                            <m:sub>
+                              <m:r>
+                                <a:rPr lang="en-US" b="0" i="1" smtClean="0">
+                                  <a:latin typeface="Cambria Math" panose="02040503050406030204" pitchFamily="18" charset="0"/>
+                                </a:rPr>
+                                <m:t>0</m:t>
+                              </m:r>
+                            </m:sub>
+                          </m:sSub>
+                        </m:num>
+                        <m:den>
+                          <m:r>
+                            <a:rPr lang="en-US" b="0" i="1" smtClean="0">
+                              <a:latin typeface="Cambria Math" panose="02040503050406030204" pitchFamily="18" charset="0"/>
+                            </a:rPr>
+                            <m:t>1+</m:t>
+                          </m:r>
+                          <m:sSup>
+                            <m:sSupPr>
+                              <m:ctrlPr>
+                                <a:rPr lang="en-US" b="0" i="1" smtClean="0">
+                                  <a:latin typeface="Cambria Math" panose="02040503050406030204" pitchFamily="18" charset="0"/>
+                                </a:rPr>
+                              </m:ctrlPr>
+                            </m:sSupPr>
+                            <m:e>
+                              <m:r>
+                                <a:rPr lang="en-US" b="0" i="1" smtClean="0">
+                                  <a:latin typeface="Cambria Math" panose="02040503050406030204" pitchFamily="18" charset="0"/>
+                                </a:rPr>
+                                <m:t>𝑒</m:t>
+                              </m:r>
+                            </m:e>
+                            <m:sup>
+                              <m:r>
+                                <a:rPr lang="en-US" b="0" i="1" smtClean="0">
+                                  <a:latin typeface="Cambria Math" panose="02040503050406030204" pitchFamily="18" charset="0"/>
+                                </a:rPr>
+                                <m:t>(</m:t>
+                              </m:r>
+                              <m:r>
+                                <a:rPr lang="en-US" b="0" i="1" smtClean="0">
+                                  <a:latin typeface="Cambria Math" panose="02040503050406030204" pitchFamily="18" charset="0"/>
+                                </a:rPr>
+                                <m:t>𝐸</m:t>
+                              </m:r>
+                              <m:r>
+                                <a:rPr lang="en-US" b="0" i="1" smtClean="0">
+                                  <a:latin typeface="Cambria Math" panose="02040503050406030204" pitchFamily="18" charset="0"/>
+                                </a:rPr>
+                                <m:t>−</m:t>
+                              </m:r>
+                              <m:sSub>
+                                <m:sSubPr>
+                                  <m:ctrlPr>
+                                    <a:rPr lang="en-US" b="0" i="1" smtClean="0">
+                                      <a:latin typeface="Cambria Math" panose="02040503050406030204" pitchFamily="18" charset="0"/>
+                                    </a:rPr>
+                                  </m:ctrlPr>
+                                </m:sSubPr>
+                                <m:e>
+                                  <m:r>
+                                    <a:rPr lang="en-US" b="0" i="1" smtClean="0">
+                                      <a:latin typeface="Cambria Math" panose="02040503050406030204" pitchFamily="18" charset="0"/>
+                                    </a:rPr>
+                                    <m:t>𝑎</m:t>
+                                  </m:r>
+                                </m:e>
+                                <m:sub>
+                                  <m:r>
+                                    <a:rPr lang="en-US" b="0" i="1" smtClean="0">
+                                      <a:latin typeface="Cambria Math" panose="02040503050406030204" pitchFamily="18" charset="0"/>
+                                    </a:rPr>
+                                    <m:t>1</m:t>
+                                  </m:r>
+                                </m:sub>
+                              </m:sSub>
+                              <m:r>
+                                <a:rPr lang="en-US" b="0" i="1" smtClean="0">
+                                  <a:latin typeface="Cambria Math" panose="02040503050406030204" pitchFamily="18" charset="0"/>
+                                </a:rPr>
+                                <m:t>)/</m:t>
+                              </m:r>
+                              <m:sSub>
+                                <m:sSubPr>
+                                  <m:ctrlPr>
+                                    <a:rPr lang="en-US" b="0" i="1" smtClean="0">
+                                      <a:latin typeface="Cambria Math" panose="02040503050406030204" pitchFamily="18" charset="0"/>
+                                    </a:rPr>
+                                  </m:ctrlPr>
+                                </m:sSubPr>
+                                <m:e>
+                                  <m:r>
+                                    <a:rPr lang="en-US" b="0" i="1" smtClean="0">
+                                      <a:latin typeface="Cambria Math" panose="02040503050406030204" pitchFamily="18" charset="0"/>
+                                    </a:rPr>
+                                    <m:t>𝑎</m:t>
+                                  </m:r>
+                                </m:e>
+                                <m:sub>
+                                  <m:r>
+                                    <a:rPr lang="en-US" b="0" i="1" smtClean="0">
+                                      <a:latin typeface="Cambria Math" panose="02040503050406030204" pitchFamily="18" charset="0"/>
+                                    </a:rPr>
+                                    <m:t>2</m:t>
+                                  </m:r>
+                                </m:sub>
+                              </m:sSub>
+                            </m:sup>
+                          </m:sSup>
+                        </m:den>
+                      </m:f>
+                    </m:oMath>
+                  </m:oMathPara>
+                </a14:m>
+                <a:endParaRPr lang="en-US" dirty="0"/>
+              </a:p>
+            </p:txBody>
+          </p:sp>
+        </mc:Choice>
+        <mc:Fallback>
+          <p:sp>
+            <p:nvSpPr>
+              <p:cNvPr id="6" name="TextBox 5"/>
+              <p:cNvSpPr txBox="1">
+                <a:spLocks noRot="1" noChangeAspect="1" noMove="1" noResize="1" noEditPoints="1" noAdjustHandles="1" noChangeArrowheads="1" noChangeShapeType="1" noTextEdit="1"/>
+              </p:cNvSpPr>
+              <p:nvPr/>
+            </p:nvSpPr>
+            <p:spPr>
+              <a:xfrm>
+                <a:off x="144855" y="773843"/>
+                <a:ext cx="3603279" cy="588174"/>
+              </a:xfrm>
+              <a:prstGeom prst="rect">
+                <a:avLst/>
+              </a:prstGeom>
+              <a:blipFill rotWithShape="0">
+                <a:blip r:embed="rId3"/>
+                <a:stretch>
+                  <a:fillRect/>
+                </a:stretch>
+              </a:blipFill>
+            </p:spPr>
+            <p:txBody>
+              <a:bodyPr/>
+              <a:lstStyle/>
+              <a:p>
+                <a:r>
+                  <a:rPr lang="en-US">
+                    <a:noFill/>
+                  </a:rPr>
+                  <a:t> </a:t>
+                </a:r>
+              </a:p>
+            </p:txBody>
+          </p:sp>
+        </mc:Fallback>
+      </mc:AlternateContent>
+      <mc:AlternateContent xmlns:mc="http://schemas.openxmlformats.org/markup-compatibility/2006">
+        <mc:Choice xmlns:a14="http://schemas.microsoft.com/office/drawing/2010/main" Requires="a14">
+          <p:sp>
+            <p:nvSpPr>
+              <p:cNvPr id="7" name="TextBox 6"/>
+              <p:cNvSpPr txBox="1"/>
+              <p:nvPr/>
+            </p:nvSpPr>
+            <p:spPr>
+              <a:xfrm>
+                <a:off x="342522" y="1499490"/>
+                <a:ext cx="5288733" cy="840615"/>
+              </a:xfrm>
+              <a:prstGeom prst="rect">
+                <a:avLst/>
+              </a:prstGeom>
+              <a:noFill/>
+            </p:spPr>
+            <p:txBody>
+              <a:bodyPr wrap="square" rtlCol="0">
+                <a:spAutoFit/>
+              </a:bodyPr>
+              <a:lstStyle/>
+              <a:p>
+                <a14:m>
+                  <m:oMathPara xmlns:m="http://schemas.openxmlformats.org/officeDocument/2006/math">
+                    <m:oMathParaPr>
+                      <m:jc m:val="centerGroup"/>
+                    </m:oMathParaPr>
+                    <m:oMath xmlns:m="http://schemas.openxmlformats.org/officeDocument/2006/math">
+                      <m:f>
+                        <m:fPr>
+                          <m:ctrlPr>
+                            <a:rPr lang="en-US" b="0" i="1" smtClean="0">
+                              <a:latin typeface="Cambria Math" panose="02040503050406030204" pitchFamily="18" charset="0"/>
+                            </a:rPr>
+                          </m:ctrlPr>
+                        </m:fPr>
+                        <m:num>
+                          <m:r>
+                            <a:rPr lang="en-US" b="0" i="1" smtClean="0">
+                              <a:latin typeface="Cambria Math" panose="02040503050406030204" pitchFamily="18" charset="0"/>
+                            </a:rPr>
+                            <m:t>𝑑𝑓</m:t>
+                          </m:r>
+                        </m:num>
+                        <m:den>
+                          <m:r>
+                            <a:rPr lang="en-US" b="0" i="1" smtClean="0">
+                              <a:latin typeface="Cambria Math" panose="02040503050406030204" pitchFamily="18" charset="0"/>
+                            </a:rPr>
+                            <m:t>𝑑𝐸</m:t>
+                          </m:r>
+                        </m:den>
+                      </m:f>
+                      <m:r>
+                        <a:rPr lang="en-US" b="0" i="1" smtClean="0">
+                          <a:latin typeface="Cambria Math" panose="02040503050406030204" pitchFamily="18" charset="0"/>
+                        </a:rPr>
+                        <m:t>=−</m:t>
+                      </m:r>
+                      <m:f>
+                        <m:fPr>
+                          <m:ctrlPr>
+                            <a:rPr lang="en-US" b="0" i="1" smtClean="0">
+                              <a:latin typeface="Cambria Math" panose="02040503050406030204" pitchFamily="18" charset="0"/>
+                            </a:rPr>
+                          </m:ctrlPr>
+                        </m:fPr>
+                        <m:num>
+                          <m:sSub>
+                            <m:sSubPr>
+                              <m:ctrlPr>
+                                <a:rPr lang="en-US" b="0" i="1" smtClean="0">
+                                  <a:latin typeface="Cambria Math" panose="02040503050406030204" pitchFamily="18" charset="0"/>
+                                </a:rPr>
+                              </m:ctrlPr>
+                            </m:sSubPr>
+                            <m:e>
+                              <m:r>
+                                <a:rPr lang="en-US" b="0" i="1" smtClean="0">
+                                  <a:latin typeface="Cambria Math" panose="02040503050406030204" pitchFamily="18" charset="0"/>
+                                </a:rPr>
+                                <m:t>𝑎</m:t>
+                              </m:r>
+                            </m:e>
+                            <m:sub>
+                              <m:r>
+                                <a:rPr lang="en-US" b="0" i="1" smtClean="0">
+                                  <a:latin typeface="Cambria Math" panose="02040503050406030204" pitchFamily="18" charset="0"/>
+                                </a:rPr>
+                                <m:t>0</m:t>
+                              </m:r>
+                            </m:sub>
+                          </m:sSub>
+                        </m:num>
+                        <m:den>
+                          <m:sSub>
+                            <m:sSubPr>
+                              <m:ctrlPr>
+                                <a:rPr lang="en-US" b="0" i="1" smtClean="0">
+                                  <a:latin typeface="Cambria Math" panose="02040503050406030204" pitchFamily="18" charset="0"/>
+                                </a:rPr>
+                              </m:ctrlPr>
+                            </m:sSubPr>
+                            <m:e>
+                              <m:r>
+                                <a:rPr lang="en-US" b="0" i="1" smtClean="0">
+                                  <a:latin typeface="Cambria Math" panose="02040503050406030204" pitchFamily="18" charset="0"/>
+                                </a:rPr>
+                                <m:t>𝑎</m:t>
+                              </m:r>
+                            </m:e>
+                            <m:sub>
+                              <m:r>
+                                <a:rPr lang="en-US" b="0" i="1" smtClean="0">
+                                  <a:latin typeface="Cambria Math" panose="02040503050406030204" pitchFamily="18" charset="0"/>
+                                </a:rPr>
+                                <m:t>2</m:t>
+                              </m:r>
+                            </m:sub>
+                          </m:sSub>
+                        </m:den>
+                      </m:f>
+                      <m:r>
+                        <a:rPr lang="en-US" b="0" i="1" smtClean="0">
+                          <a:latin typeface="Cambria Math" panose="02040503050406030204" pitchFamily="18" charset="0"/>
+                          <a:ea typeface="Cambria Math" panose="02040503050406030204" pitchFamily="18" charset="0"/>
+                        </a:rPr>
+                        <m:t>×</m:t>
+                      </m:r>
+                      <m:d>
+                        <m:dPr>
+                          <m:ctrlPr>
+                            <a:rPr lang="en-US" b="0" i="1" smtClean="0">
+                              <a:latin typeface="Cambria Math" panose="02040503050406030204" pitchFamily="18" charset="0"/>
+                              <a:ea typeface="Cambria Math" panose="02040503050406030204" pitchFamily="18" charset="0"/>
+                            </a:rPr>
+                          </m:ctrlPr>
+                        </m:dPr>
+                        <m:e>
+                          <m:f>
+                            <m:fPr>
+                              <m:ctrlPr>
+                                <a:rPr lang="en-US" i="1">
+                                  <a:latin typeface="Cambria Math" panose="02040503050406030204" pitchFamily="18" charset="0"/>
+                                </a:rPr>
+                              </m:ctrlPr>
+                            </m:fPr>
+                            <m:num>
+                              <m:r>
+                                <a:rPr lang="en-US" i="1">
+                                  <a:latin typeface="Cambria Math" panose="02040503050406030204" pitchFamily="18" charset="0"/>
+                                </a:rPr>
+                                <m:t>1</m:t>
+                              </m:r>
+                            </m:num>
+                            <m:den>
+                              <m:r>
+                                <a:rPr lang="en-US" i="1">
+                                  <a:latin typeface="Cambria Math" panose="02040503050406030204" pitchFamily="18" charset="0"/>
+                                </a:rPr>
+                                <m:t>1+</m:t>
+                              </m:r>
+                              <m:sSup>
+                                <m:sSupPr>
+                                  <m:ctrlPr>
+                                    <a:rPr lang="en-US" i="1">
+                                      <a:latin typeface="Cambria Math" panose="02040503050406030204" pitchFamily="18" charset="0"/>
+                                    </a:rPr>
+                                  </m:ctrlPr>
+                                </m:sSupPr>
+                                <m:e>
+                                  <m:r>
+                                    <a:rPr lang="en-US" i="1">
+                                      <a:latin typeface="Cambria Math" panose="02040503050406030204" pitchFamily="18" charset="0"/>
+                                    </a:rPr>
+                                    <m:t>𝑒</m:t>
+                                  </m:r>
+                                </m:e>
+                                <m:sup>
+                                  <m:r>
+                                    <a:rPr lang="en-US" i="1">
+                                      <a:latin typeface="Cambria Math" panose="02040503050406030204" pitchFamily="18" charset="0"/>
+                                    </a:rPr>
+                                    <m:t>(</m:t>
+                                  </m:r>
+                                  <m:r>
+                                    <a:rPr lang="en-US" i="1">
+                                      <a:latin typeface="Cambria Math" panose="02040503050406030204" pitchFamily="18" charset="0"/>
+                                    </a:rPr>
+                                    <m:t>𝐸</m:t>
+                                  </m:r>
+                                  <m:r>
+                                    <a:rPr lang="en-US" i="1">
+                                      <a:latin typeface="Cambria Math" panose="02040503050406030204" pitchFamily="18" charset="0"/>
+                                    </a:rPr>
+                                    <m:t>−</m:t>
+                                  </m:r>
+                                  <m:sSub>
+                                    <m:sSubPr>
+                                      <m:ctrlPr>
+                                        <a:rPr lang="en-US" i="1">
+                                          <a:latin typeface="Cambria Math" panose="02040503050406030204" pitchFamily="18" charset="0"/>
+                                        </a:rPr>
+                                      </m:ctrlPr>
+                                    </m:sSubPr>
+                                    <m:e>
+                                      <m:r>
+                                        <a:rPr lang="en-US" i="1">
+                                          <a:latin typeface="Cambria Math" panose="02040503050406030204" pitchFamily="18" charset="0"/>
+                                        </a:rPr>
+                                        <m:t>𝑎</m:t>
+                                      </m:r>
+                                    </m:e>
+                                    <m:sub>
+                                      <m:r>
+                                        <a:rPr lang="en-US" i="1">
+                                          <a:latin typeface="Cambria Math" panose="02040503050406030204" pitchFamily="18" charset="0"/>
+                                        </a:rPr>
+                                        <m:t>1</m:t>
+                                      </m:r>
+                                    </m:sub>
+                                  </m:sSub>
+                                  <m:r>
+                                    <a:rPr lang="en-US" i="1">
+                                      <a:latin typeface="Cambria Math" panose="02040503050406030204" pitchFamily="18" charset="0"/>
+                                    </a:rPr>
+                                    <m:t>)/</m:t>
+                                  </m:r>
+                                  <m:sSub>
+                                    <m:sSubPr>
+                                      <m:ctrlPr>
+                                        <a:rPr lang="en-US" i="1">
+                                          <a:latin typeface="Cambria Math" panose="02040503050406030204" pitchFamily="18" charset="0"/>
+                                        </a:rPr>
+                                      </m:ctrlPr>
+                                    </m:sSubPr>
+                                    <m:e>
+                                      <m:r>
+                                        <a:rPr lang="en-US" i="1">
+                                          <a:latin typeface="Cambria Math" panose="02040503050406030204" pitchFamily="18" charset="0"/>
+                                        </a:rPr>
+                                        <m:t>𝑎</m:t>
+                                      </m:r>
+                                    </m:e>
+                                    <m:sub>
+                                      <m:r>
+                                        <a:rPr lang="en-US" i="1">
+                                          <a:latin typeface="Cambria Math" panose="02040503050406030204" pitchFamily="18" charset="0"/>
+                                        </a:rPr>
+                                        <m:t>2</m:t>
+                                      </m:r>
+                                    </m:sub>
+                                  </m:sSub>
+                                </m:sup>
+                              </m:sSup>
+                            </m:den>
+                          </m:f>
+                          <m:r>
+                            <a:rPr lang="en-US" b="0" i="1" smtClean="0">
+                              <a:latin typeface="Cambria Math" panose="02040503050406030204" pitchFamily="18" charset="0"/>
+                            </a:rPr>
+                            <m:t>−</m:t>
+                          </m:r>
+                          <m:sSup>
+                            <m:sSupPr>
+                              <m:ctrlPr>
+                                <a:rPr lang="en-US" b="0" i="1" smtClean="0">
+                                  <a:latin typeface="Cambria Math" panose="02040503050406030204" pitchFamily="18" charset="0"/>
+                                </a:rPr>
+                              </m:ctrlPr>
+                            </m:sSupPr>
+                            <m:e>
+                              <m:d>
+                                <m:dPr>
+                                  <m:ctrlPr>
+                                    <a:rPr lang="en-US" i="1">
+                                      <a:latin typeface="Cambria Math" panose="02040503050406030204" pitchFamily="18" charset="0"/>
+                                    </a:rPr>
+                                  </m:ctrlPr>
+                                </m:dPr>
+                                <m:e>
+                                  <m:f>
+                                    <m:fPr>
+                                      <m:ctrlPr>
+                                        <a:rPr lang="en-US" i="1">
+                                          <a:latin typeface="Cambria Math" panose="02040503050406030204" pitchFamily="18" charset="0"/>
+                                        </a:rPr>
+                                      </m:ctrlPr>
+                                    </m:fPr>
+                                    <m:num>
+                                      <m:r>
+                                        <a:rPr lang="en-US" i="1">
+                                          <a:latin typeface="Cambria Math" panose="02040503050406030204" pitchFamily="18" charset="0"/>
+                                        </a:rPr>
+                                        <m:t>1</m:t>
+                                      </m:r>
+                                    </m:num>
+                                    <m:den>
+                                      <m:r>
+                                        <a:rPr lang="en-US" i="1">
+                                          <a:latin typeface="Cambria Math" panose="02040503050406030204" pitchFamily="18" charset="0"/>
+                                        </a:rPr>
+                                        <m:t>1+</m:t>
+                                      </m:r>
+                                      <m:sSup>
+                                        <m:sSupPr>
+                                          <m:ctrlPr>
+                                            <a:rPr lang="en-US" i="1">
+                                              <a:latin typeface="Cambria Math" panose="02040503050406030204" pitchFamily="18" charset="0"/>
+                                            </a:rPr>
+                                          </m:ctrlPr>
+                                        </m:sSupPr>
+                                        <m:e>
+                                          <m:r>
+                                            <a:rPr lang="en-US" i="1">
+                                              <a:latin typeface="Cambria Math" panose="02040503050406030204" pitchFamily="18" charset="0"/>
+                                            </a:rPr>
+                                            <m:t>𝑒</m:t>
+                                          </m:r>
+                                        </m:e>
+                                        <m:sup>
+                                          <m:r>
+                                            <a:rPr lang="en-US" i="1">
+                                              <a:latin typeface="Cambria Math" panose="02040503050406030204" pitchFamily="18" charset="0"/>
+                                            </a:rPr>
+                                            <m:t>(</m:t>
+                                          </m:r>
+                                          <m:r>
+                                            <a:rPr lang="en-US" i="1">
+                                              <a:latin typeface="Cambria Math" panose="02040503050406030204" pitchFamily="18" charset="0"/>
+                                            </a:rPr>
+                                            <m:t>𝐸</m:t>
+                                          </m:r>
+                                          <m:r>
+                                            <a:rPr lang="en-US" i="1">
+                                              <a:latin typeface="Cambria Math" panose="02040503050406030204" pitchFamily="18" charset="0"/>
+                                            </a:rPr>
+                                            <m:t>−</m:t>
+                                          </m:r>
+                                          <m:sSub>
+                                            <m:sSubPr>
+                                              <m:ctrlPr>
+                                                <a:rPr lang="en-US" i="1">
+                                                  <a:latin typeface="Cambria Math" panose="02040503050406030204" pitchFamily="18" charset="0"/>
+                                                </a:rPr>
+                                              </m:ctrlPr>
+                                            </m:sSubPr>
+                                            <m:e>
+                                              <m:r>
+                                                <a:rPr lang="en-US" i="1">
+                                                  <a:latin typeface="Cambria Math" panose="02040503050406030204" pitchFamily="18" charset="0"/>
+                                                </a:rPr>
+                                                <m:t>𝑎</m:t>
+                                              </m:r>
+                                            </m:e>
+                                            <m:sub>
+                                              <m:r>
+                                                <a:rPr lang="en-US" i="1">
+                                                  <a:latin typeface="Cambria Math" panose="02040503050406030204" pitchFamily="18" charset="0"/>
+                                                </a:rPr>
+                                                <m:t>1</m:t>
+                                              </m:r>
+                                            </m:sub>
+                                          </m:sSub>
+                                          <m:r>
+                                            <a:rPr lang="en-US" i="1">
+                                              <a:latin typeface="Cambria Math" panose="02040503050406030204" pitchFamily="18" charset="0"/>
+                                            </a:rPr>
+                                            <m:t>)/</m:t>
+                                          </m:r>
+                                          <m:sSub>
+                                            <m:sSubPr>
+                                              <m:ctrlPr>
+                                                <a:rPr lang="en-US" i="1">
+                                                  <a:latin typeface="Cambria Math" panose="02040503050406030204" pitchFamily="18" charset="0"/>
+                                                </a:rPr>
+                                              </m:ctrlPr>
+                                            </m:sSubPr>
+                                            <m:e>
+                                              <m:r>
+                                                <a:rPr lang="en-US" i="1">
+                                                  <a:latin typeface="Cambria Math" panose="02040503050406030204" pitchFamily="18" charset="0"/>
+                                                </a:rPr>
+                                                <m:t>𝑎</m:t>
+                                              </m:r>
+                                            </m:e>
+                                            <m:sub>
+                                              <m:r>
+                                                <a:rPr lang="en-US" i="1">
+                                                  <a:latin typeface="Cambria Math" panose="02040503050406030204" pitchFamily="18" charset="0"/>
+                                                </a:rPr>
+                                                <m:t>2</m:t>
+                                              </m:r>
+                                            </m:sub>
+                                          </m:sSub>
+                                        </m:sup>
+                                      </m:sSup>
+                                    </m:den>
+                                  </m:f>
+                                </m:e>
+                              </m:d>
+                            </m:e>
+                            <m:sup>
+                              <m:r>
+                                <a:rPr lang="en-US" b="0" i="1" smtClean="0">
+                                  <a:latin typeface="Cambria Math" panose="02040503050406030204" pitchFamily="18" charset="0"/>
+                                </a:rPr>
+                                <m:t>2</m:t>
+                              </m:r>
+                            </m:sup>
+                          </m:sSup>
+                        </m:e>
+                      </m:d>
+                    </m:oMath>
+                  </m:oMathPara>
+                </a14:m>
+                <a:endParaRPr lang="en-US" dirty="0"/>
+              </a:p>
+            </p:txBody>
+          </p:sp>
+        </mc:Choice>
+        <mc:Fallback>
+          <p:sp>
+            <p:nvSpPr>
+              <p:cNvPr id="7" name="TextBox 6"/>
+              <p:cNvSpPr txBox="1">
+                <a:spLocks noRot="1" noChangeAspect="1" noMove="1" noResize="1" noEditPoints="1" noAdjustHandles="1" noChangeArrowheads="1" noChangeShapeType="1" noTextEdit="1"/>
+              </p:cNvSpPr>
+              <p:nvPr/>
+            </p:nvSpPr>
+            <p:spPr>
+              <a:xfrm>
+                <a:off x="342522" y="1499490"/>
+                <a:ext cx="5288733" cy="840615"/>
+              </a:xfrm>
+              <a:prstGeom prst="rect">
+                <a:avLst/>
+              </a:prstGeom>
+              <a:blipFill rotWithShape="0">
+                <a:blip r:embed="rId4"/>
+                <a:stretch>
+                  <a:fillRect/>
+                </a:stretch>
+              </a:blipFill>
+            </p:spPr>
+            <p:txBody>
+              <a:bodyPr/>
+              <a:lstStyle/>
+              <a:p>
+                <a:r>
+                  <a:rPr lang="en-US">
+                    <a:noFill/>
+                  </a:rPr>
+                  <a:t> </a:t>
+                </a:r>
+              </a:p>
+            </p:txBody>
+          </p:sp>
+        </mc:Fallback>
+      </mc:AlternateContent>
+      <mc:AlternateContent xmlns:mc="http://schemas.openxmlformats.org/markup-compatibility/2006">
+        <mc:Choice xmlns:a14="http://schemas.microsoft.com/office/drawing/2010/main" Requires="a14">
+          <p:sp>
+            <p:nvSpPr>
+              <p:cNvPr id="8" name="TextBox 7"/>
+              <p:cNvSpPr txBox="1"/>
+              <p:nvPr/>
+            </p:nvSpPr>
+            <p:spPr>
+              <a:xfrm>
+                <a:off x="0" y="2477579"/>
+                <a:ext cx="3170221" cy="664990"/>
+              </a:xfrm>
+              <a:prstGeom prst="rect">
+                <a:avLst/>
+              </a:prstGeom>
+              <a:noFill/>
+            </p:spPr>
+            <p:txBody>
+              <a:bodyPr wrap="square" rtlCol="0">
+                <a:spAutoFit/>
+              </a:bodyPr>
+              <a:lstStyle/>
+              <a:p>
+                <a14:m>
+                  <m:oMathPara xmlns:m="http://schemas.openxmlformats.org/officeDocument/2006/math">
+                    <m:oMathParaPr>
+                      <m:jc m:val="centerGroup"/>
+                    </m:oMathParaPr>
+                    <m:oMath xmlns:m="http://schemas.openxmlformats.org/officeDocument/2006/math">
+                      <m:f>
+                        <m:fPr>
+                          <m:ctrlPr>
+                            <a:rPr lang="en-US" b="1" i="1" smtClean="0">
+                              <a:solidFill>
+                                <a:srgbClr val="FF0000"/>
+                              </a:solidFill>
+                              <a:latin typeface="Cambria Math" panose="02040503050406030204" pitchFamily="18" charset="0"/>
+                            </a:rPr>
+                          </m:ctrlPr>
+                        </m:fPr>
+                        <m:num>
+                          <m:sSup>
+                            <m:sSupPr>
+                              <m:ctrlPr>
+                                <a:rPr lang="en-US" b="1" i="1" smtClean="0">
+                                  <a:solidFill>
+                                    <a:srgbClr val="FF0000"/>
+                                  </a:solidFill>
+                                  <a:latin typeface="Cambria Math" panose="02040503050406030204" pitchFamily="18" charset="0"/>
+                                </a:rPr>
+                              </m:ctrlPr>
+                            </m:sSupPr>
+                            <m:e>
+                              <m:r>
+                                <a:rPr lang="en-US" b="1" i="1" smtClean="0">
+                                  <a:solidFill>
+                                    <a:srgbClr val="FF0000"/>
+                                  </a:solidFill>
+                                  <a:latin typeface="Cambria Math" panose="02040503050406030204" pitchFamily="18" charset="0"/>
+                                </a:rPr>
+                                <m:t>𝒅</m:t>
+                              </m:r>
+                            </m:e>
+                            <m:sup>
+                              <m:r>
+                                <a:rPr lang="en-US" b="1" i="1" smtClean="0">
+                                  <a:solidFill>
+                                    <a:srgbClr val="FF0000"/>
+                                  </a:solidFill>
+                                  <a:latin typeface="Cambria Math" panose="02040503050406030204" pitchFamily="18" charset="0"/>
+                                </a:rPr>
+                                <m:t>𝟐</m:t>
+                              </m:r>
+                            </m:sup>
+                          </m:sSup>
+                          <m:r>
+                            <a:rPr lang="en-US" b="1" i="1" smtClean="0">
+                              <a:solidFill>
+                                <a:srgbClr val="FF0000"/>
+                              </a:solidFill>
+                              <a:latin typeface="Cambria Math" panose="02040503050406030204" pitchFamily="18" charset="0"/>
+                            </a:rPr>
+                            <m:t>𝒇</m:t>
+                          </m:r>
+                        </m:num>
+                        <m:den>
+                          <m:sSup>
+                            <m:sSupPr>
+                              <m:ctrlPr>
+                                <a:rPr lang="en-US" b="1" i="1" smtClean="0">
+                                  <a:solidFill>
+                                    <a:srgbClr val="FF0000"/>
+                                  </a:solidFill>
+                                  <a:latin typeface="Cambria Math" panose="02040503050406030204" pitchFamily="18" charset="0"/>
+                                </a:rPr>
+                              </m:ctrlPr>
+                            </m:sSupPr>
+                            <m:e>
+                              <m:r>
+                                <a:rPr lang="en-US" b="1" i="1" smtClean="0">
+                                  <a:solidFill>
+                                    <a:srgbClr val="FF0000"/>
+                                  </a:solidFill>
+                                  <a:latin typeface="Cambria Math" panose="02040503050406030204" pitchFamily="18" charset="0"/>
+                                </a:rPr>
+                                <m:t>𝒅</m:t>
+                              </m:r>
+                            </m:e>
+                            <m:sup>
+                              <m:r>
+                                <a:rPr lang="en-US" b="1" i="1" smtClean="0">
+                                  <a:solidFill>
+                                    <a:srgbClr val="FF0000"/>
+                                  </a:solidFill>
+                                  <a:latin typeface="Cambria Math" panose="02040503050406030204" pitchFamily="18" charset="0"/>
+                                </a:rPr>
+                                <m:t>𝟐</m:t>
+                              </m:r>
+                            </m:sup>
+                          </m:sSup>
+                          <m:r>
+                            <a:rPr lang="en-US" b="1" i="1" smtClean="0">
+                              <a:solidFill>
+                                <a:srgbClr val="FF0000"/>
+                              </a:solidFill>
+                              <a:latin typeface="Cambria Math" panose="02040503050406030204" pitchFamily="18" charset="0"/>
+                            </a:rPr>
+                            <m:t>𝑬</m:t>
+                          </m:r>
+                        </m:den>
+                      </m:f>
+                      <m:r>
+                        <a:rPr lang="en-US" b="1" i="1" smtClean="0">
+                          <a:solidFill>
+                            <a:srgbClr val="FF0000"/>
+                          </a:solidFill>
+                          <a:latin typeface="Cambria Math" panose="02040503050406030204" pitchFamily="18" charset="0"/>
+                        </a:rPr>
+                        <m:t>=</m:t>
+                      </m:r>
+                      <m:r>
+                        <a:rPr lang="en-US" b="1" i="1" smtClean="0">
+                          <a:solidFill>
+                            <a:srgbClr val="FF0000"/>
+                          </a:solidFill>
+                          <a:latin typeface="Cambria Math" panose="02040503050406030204" pitchFamily="18" charset="0"/>
+                        </a:rPr>
+                        <m:t>𝟎</m:t>
+                      </m:r>
+                      <m:r>
+                        <a:rPr lang="en-US" b="1" i="1" smtClean="0">
+                          <a:solidFill>
+                            <a:srgbClr val="FF0000"/>
+                          </a:solidFill>
+                          <a:latin typeface="Cambria Math" panose="02040503050406030204" pitchFamily="18" charset="0"/>
+                        </a:rPr>
+                        <m:t>  ⇒</m:t>
+                      </m:r>
+                      <m:r>
+                        <a:rPr lang="en-US" b="1" i="1" smtClean="0">
+                          <a:solidFill>
+                            <a:srgbClr val="FF0000"/>
+                          </a:solidFill>
+                          <a:latin typeface="Cambria Math" panose="02040503050406030204" pitchFamily="18" charset="0"/>
+                          <a:ea typeface="Cambria Math" panose="02040503050406030204" pitchFamily="18" charset="0"/>
+                        </a:rPr>
+                        <m:t>𝑬</m:t>
+                      </m:r>
+                      <m:r>
+                        <a:rPr lang="en-US" b="1" i="1" smtClean="0">
+                          <a:solidFill>
+                            <a:srgbClr val="FF0000"/>
+                          </a:solidFill>
+                          <a:latin typeface="Cambria Math" panose="02040503050406030204" pitchFamily="18" charset="0"/>
+                          <a:ea typeface="Cambria Math" panose="02040503050406030204" pitchFamily="18" charset="0"/>
+                        </a:rPr>
+                        <m:t>=</m:t>
+                      </m:r>
+                      <m:sSub>
+                        <m:sSubPr>
+                          <m:ctrlPr>
+                            <a:rPr lang="en-US" b="1" i="1" smtClean="0">
+                              <a:solidFill>
+                                <a:srgbClr val="FF0000"/>
+                              </a:solidFill>
+                              <a:latin typeface="Cambria Math" panose="02040503050406030204" pitchFamily="18" charset="0"/>
+                              <a:ea typeface="Cambria Math" panose="02040503050406030204" pitchFamily="18" charset="0"/>
+                            </a:rPr>
+                          </m:ctrlPr>
+                        </m:sSubPr>
+                        <m:e>
+                          <m:r>
+                            <a:rPr lang="en-US" b="1" i="1" smtClean="0">
+                              <a:solidFill>
+                                <a:srgbClr val="FF0000"/>
+                              </a:solidFill>
+                              <a:latin typeface="Cambria Math" panose="02040503050406030204" pitchFamily="18" charset="0"/>
+                              <a:ea typeface="Cambria Math" panose="02040503050406030204" pitchFamily="18" charset="0"/>
+                            </a:rPr>
+                            <m:t>𝒂</m:t>
+                          </m:r>
+                        </m:e>
+                        <m:sub>
+                          <m:r>
+                            <a:rPr lang="en-US" b="1" i="1" smtClean="0">
+                              <a:solidFill>
+                                <a:srgbClr val="FF0000"/>
+                              </a:solidFill>
+                              <a:latin typeface="Cambria Math" panose="02040503050406030204" pitchFamily="18" charset="0"/>
+                              <a:ea typeface="Cambria Math" panose="02040503050406030204" pitchFamily="18" charset="0"/>
+                            </a:rPr>
+                            <m:t>𝟏</m:t>
+                          </m:r>
+                        </m:sub>
+                      </m:sSub>
+                    </m:oMath>
+                  </m:oMathPara>
+                </a14:m>
+                <a:endParaRPr lang="en-US" b="1" dirty="0"/>
+              </a:p>
+            </p:txBody>
+          </p:sp>
+        </mc:Choice>
+        <mc:Fallback>
+          <p:sp>
+            <p:nvSpPr>
+              <p:cNvPr id="8" name="TextBox 7"/>
+              <p:cNvSpPr txBox="1">
+                <a:spLocks noRot="1" noChangeAspect="1" noMove="1" noResize="1" noEditPoints="1" noAdjustHandles="1" noChangeArrowheads="1" noChangeShapeType="1" noTextEdit="1"/>
+              </p:cNvSpPr>
+              <p:nvPr/>
+            </p:nvSpPr>
+            <p:spPr>
+              <a:xfrm>
+                <a:off x="0" y="2477579"/>
+                <a:ext cx="3170221" cy="664990"/>
+              </a:xfrm>
+              <a:prstGeom prst="rect">
+                <a:avLst/>
+              </a:prstGeom>
+              <a:blipFill rotWithShape="0">
+                <a:blip r:embed="rId5"/>
+                <a:stretch>
+                  <a:fillRect/>
+                </a:stretch>
+              </a:blipFill>
+            </p:spPr>
+            <p:txBody>
+              <a:bodyPr/>
+              <a:lstStyle/>
+              <a:p>
+                <a:r>
+                  <a:rPr lang="en-US">
+                    <a:noFill/>
+                  </a:rPr>
+                  <a:t> </a:t>
+                </a:r>
+              </a:p>
+            </p:txBody>
+          </p:sp>
+        </mc:Fallback>
+      </mc:AlternateContent>
+      <mc:AlternateContent xmlns:mc="http://schemas.openxmlformats.org/markup-compatibility/2006">
+        <mc:Choice xmlns:a14="http://schemas.microsoft.com/office/drawing/2010/main" Requires="a14">
+          <p:sp>
+            <p:nvSpPr>
+              <p:cNvPr id="9" name="TextBox 8"/>
+              <p:cNvSpPr txBox="1"/>
+              <p:nvPr/>
+            </p:nvSpPr>
+            <p:spPr>
+              <a:xfrm>
+                <a:off x="208229" y="3417811"/>
+                <a:ext cx="5556929" cy="369332"/>
+              </a:xfrm>
+              <a:prstGeom prst="rect">
+                <a:avLst/>
+              </a:prstGeom>
+              <a:noFill/>
+              <a:ln w="28575">
+                <a:solidFill>
+                  <a:srgbClr val="FF0000"/>
+                </a:solidFill>
+              </a:ln>
+            </p:spPr>
+            <p:txBody>
+              <a:bodyPr wrap="square" rtlCol="0">
+                <a:spAutoFit/>
+              </a:bodyPr>
+              <a:lstStyle/>
+              <a:p>
+                <a:r>
+                  <a:rPr lang="en-US" dirty="0" smtClean="0"/>
+                  <a:t>● </a:t>
+                </a:r>
+                <a:r>
+                  <a:rPr lang="en-US" b="1" dirty="0" smtClean="0"/>
+                  <a:t>parameter </a:t>
+                </a:r>
+                <a14:m>
+                  <m:oMath xmlns:m="http://schemas.openxmlformats.org/officeDocument/2006/math">
+                    <m:sSub>
+                      <m:sSubPr>
+                        <m:ctrlPr>
+                          <a:rPr lang="en-US" b="1" i="1">
+                            <a:solidFill>
+                              <a:srgbClr val="FF0000"/>
+                            </a:solidFill>
+                            <a:latin typeface="Cambria Math" panose="02040503050406030204" pitchFamily="18" charset="0"/>
+                            <a:ea typeface="Cambria Math" panose="02040503050406030204" pitchFamily="18" charset="0"/>
+                          </a:rPr>
+                        </m:ctrlPr>
+                      </m:sSubPr>
+                      <m:e>
+                        <m:r>
+                          <a:rPr lang="en-US" b="1" i="1">
+                            <a:solidFill>
+                              <a:srgbClr val="FF0000"/>
+                            </a:solidFill>
+                            <a:latin typeface="Cambria Math" panose="02040503050406030204" pitchFamily="18" charset="0"/>
+                            <a:ea typeface="Cambria Math" panose="02040503050406030204" pitchFamily="18" charset="0"/>
+                          </a:rPr>
+                          <m:t>𝒂</m:t>
+                        </m:r>
+                      </m:e>
+                      <m:sub>
+                        <m:r>
+                          <a:rPr lang="en-US" b="1" i="1">
+                            <a:solidFill>
+                              <a:srgbClr val="FF0000"/>
+                            </a:solidFill>
+                            <a:latin typeface="Cambria Math" panose="02040503050406030204" pitchFamily="18" charset="0"/>
+                            <a:ea typeface="Cambria Math" panose="02040503050406030204" pitchFamily="18" charset="0"/>
+                          </a:rPr>
+                          <m:t>𝟏</m:t>
+                        </m:r>
+                      </m:sub>
+                    </m:sSub>
+                  </m:oMath>
+                </a14:m>
+                <a:r>
+                  <a:rPr lang="en-US" b="1" dirty="0" smtClean="0"/>
+                  <a:t> is the current punch through points.</a:t>
+                </a:r>
+                <a:endParaRPr lang="en-US" b="1" dirty="0"/>
+              </a:p>
+            </p:txBody>
+          </p:sp>
+        </mc:Choice>
+        <mc:Fallback>
+          <p:sp>
+            <p:nvSpPr>
+              <p:cNvPr id="9" name="TextBox 8"/>
+              <p:cNvSpPr txBox="1">
+                <a:spLocks noRot="1" noChangeAspect="1" noMove="1" noResize="1" noEditPoints="1" noAdjustHandles="1" noChangeArrowheads="1" noChangeShapeType="1" noTextEdit="1"/>
+              </p:cNvSpPr>
+              <p:nvPr/>
+            </p:nvSpPr>
+            <p:spPr>
+              <a:xfrm>
+                <a:off x="208229" y="3417811"/>
+                <a:ext cx="5556929" cy="369332"/>
+              </a:xfrm>
+              <a:prstGeom prst="rect">
+                <a:avLst/>
+              </a:prstGeom>
+              <a:blipFill rotWithShape="0">
+                <a:blip r:embed="rId6"/>
+                <a:stretch>
+                  <a:fillRect l="-654" t="-6154" b="-20000"/>
+                </a:stretch>
+              </a:blipFill>
+              <a:ln w="28575">
+                <a:solidFill>
+                  <a:srgbClr val="FF0000"/>
+                </a:solidFill>
+              </a:ln>
+            </p:spPr>
+            <p:txBody>
+              <a:bodyPr/>
+              <a:lstStyle/>
+              <a:p>
+                <a:r>
+                  <a:rPr lang="en-US">
+                    <a:noFill/>
+                  </a:rPr>
+                  <a:t> </a:t>
+                </a:r>
+              </a:p>
+            </p:txBody>
+          </p:sp>
+        </mc:Fallback>
+      </mc:AlternateContent>
     </p:spTree>
     <p:extLst>
       <p:ext uri="{BB962C8B-B14F-4D97-AF65-F5344CB8AC3E}">
@@ -13413,6 +15278,295 @@
           <a:chExt cx="0" cy="0"/>
         </a:xfrm>
       </p:grpSpPr>
+      <p:sp>
+        <p:nvSpPr>
+          <p:cNvPr id="2" name="TextBox 1"/>
+          <p:cNvSpPr txBox="1"/>
+          <p:nvPr/>
+        </p:nvSpPr>
+        <p:spPr>
+          <a:xfrm>
+            <a:off x="117695" y="185724"/>
+            <a:ext cx="5556929" cy="1754326"/>
+          </a:xfrm>
+          <a:prstGeom prst="rect">
+            <a:avLst/>
+          </a:prstGeom>
+          <a:noFill/>
+        </p:spPr>
+        <p:txBody>
+          <a:bodyPr wrap="square" rtlCol="0">
+            <a:spAutoFit/>
+          </a:bodyPr>
+          <a:lstStyle/>
+          <a:p>
+            <a:r>
+              <a:rPr lang="en-US" dirty="0" smtClean="0"/>
+              <a:t>● </a:t>
+            </a:r>
+            <a:r>
+              <a:rPr lang="en-US" b="1" dirty="0" smtClean="0"/>
+              <a:t>The details how to get this punch through points</a:t>
+            </a:r>
+          </a:p>
+          <a:p>
+            <a:r>
+              <a:rPr lang="en-US" dirty="0"/>
+              <a:t> </a:t>
+            </a:r>
+            <a:r>
+              <a:rPr lang="en-US" dirty="0" smtClean="0"/>
+              <a:t>   </a:t>
+            </a:r>
+          </a:p>
+          <a:p>
+            <a:r>
+              <a:rPr lang="en-US" dirty="0"/>
+              <a:t> </a:t>
+            </a:r>
+            <a:r>
+              <a:rPr lang="en-US" dirty="0" smtClean="0"/>
+              <a:t>   </a:t>
+            </a:r>
+            <a:r>
+              <a:rPr lang="en-US" dirty="0"/>
+              <a:t>● Run this program: </a:t>
+            </a:r>
+            <a:r>
+              <a:rPr lang="en-US" b="1" dirty="0" err="1">
+                <a:solidFill>
+                  <a:srgbClr val="FF0000"/>
+                </a:solidFill>
+              </a:rPr>
+              <a:t>TogetPunchThroughPoints.C</a:t>
+            </a:r>
+            <a:endParaRPr lang="en-US" b="1" dirty="0" smtClean="0">
+              <a:solidFill>
+                <a:srgbClr val="FF0000"/>
+              </a:solidFill>
+            </a:endParaRPr>
+          </a:p>
+          <a:p>
+            <a:endParaRPr lang="en-US" dirty="0"/>
+          </a:p>
+          <a:p>
+            <a:r>
+              <a:rPr lang="en-US" dirty="0" smtClean="0"/>
+              <a:t>    ● Zoom and press the central button of the mouse to</a:t>
+            </a:r>
+          </a:p>
+          <a:p>
+            <a:r>
+              <a:rPr lang="en-US" dirty="0"/>
+              <a:t> </a:t>
+            </a:r>
+            <a:r>
+              <a:rPr lang="en-US" dirty="0" smtClean="0"/>
+              <a:t>       set the range, and then fit automatically.</a:t>
+            </a:r>
+            <a:endParaRPr lang="en-US" dirty="0"/>
+          </a:p>
+        </p:txBody>
+      </p:sp>
+      <p:pic>
+        <p:nvPicPr>
+          <p:cNvPr id="3" name="Picture 2"/>
+          <p:cNvPicPr>
+            <a:picLocks noChangeAspect="1"/>
+          </p:cNvPicPr>
+          <p:nvPr/>
+        </p:nvPicPr>
+        <p:blipFill>
+          <a:blip r:embed="rId2" cstate="print">
+            <a:extLst>
+              <a:ext uri="{28A0092B-C50C-407E-A947-70E740481C1C}">
+                <a14:useLocalDpi xmlns:a14="http://schemas.microsoft.com/office/drawing/2010/main" val="0"/>
+              </a:ext>
+            </a:extLst>
+          </a:blip>
+          <a:stretch>
+            <a:fillRect/>
+          </a:stretch>
+        </p:blipFill>
+        <p:spPr>
+          <a:xfrm>
+            <a:off x="7351595" y="87112"/>
+            <a:ext cx="3977618" cy="2646334"/>
+          </a:xfrm>
+          <a:prstGeom prst="rect">
+            <a:avLst/>
+          </a:prstGeom>
+        </p:spPr>
+      </p:pic>
+      <p:pic>
+        <p:nvPicPr>
+          <p:cNvPr id="4" name="Picture 3"/>
+          <p:cNvPicPr>
+            <a:picLocks noChangeAspect="1"/>
+          </p:cNvPicPr>
+          <p:nvPr/>
+        </p:nvPicPr>
+        <p:blipFill>
+          <a:blip r:embed="rId3">
+            <a:extLst>
+              <a:ext uri="{28A0092B-C50C-407E-A947-70E740481C1C}">
+                <a14:useLocalDpi xmlns:a14="http://schemas.microsoft.com/office/drawing/2010/main" val="0"/>
+              </a:ext>
+            </a:extLst>
+          </a:blip>
+          <a:stretch>
+            <a:fillRect/>
+          </a:stretch>
+        </p:blipFill>
+        <p:spPr>
+          <a:xfrm>
+            <a:off x="7064187" y="3043041"/>
+            <a:ext cx="4803447" cy="3288936"/>
+          </a:xfrm>
+          <a:prstGeom prst="rect">
+            <a:avLst/>
+          </a:prstGeom>
+        </p:spPr>
+      </p:pic>
+      <p:sp>
+        <p:nvSpPr>
+          <p:cNvPr id="5" name="Rectangle 4"/>
+          <p:cNvSpPr/>
+          <p:nvPr/>
+        </p:nvSpPr>
+        <p:spPr>
+          <a:xfrm>
+            <a:off x="331693" y="2046297"/>
+            <a:ext cx="7351059" cy="646331"/>
+          </a:xfrm>
+          <a:prstGeom prst="rect">
+            <a:avLst/>
+          </a:prstGeom>
+        </p:spPr>
+        <p:txBody>
+          <a:bodyPr wrap="square">
+            <a:spAutoFit/>
+          </a:bodyPr>
+          <a:lstStyle/>
+          <a:p>
+            <a:r>
+              <a:rPr lang="en-US" dirty="0" smtClean="0"/>
+              <a:t>● If the fit looks good, </a:t>
+            </a:r>
+            <a:r>
+              <a:rPr lang="en-US" dirty="0" smtClean="0">
+                <a:solidFill>
+                  <a:srgbClr val="FF0000"/>
+                </a:solidFill>
+              </a:rPr>
+              <a:t>input “1”</a:t>
+            </a:r>
+            <a:r>
+              <a:rPr lang="en-US" dirty="0" smtClean="0"/>
+              <a:t> in the terminal, and then fit the </a:t>
+            </a:r>
+          </a:p>
+          <a:p>
+            <a:r>
+              <a:rPr lang="en-US" dirty="0"/>
+              <a:t> </a:t>
+            </a:r>
+            <a:r>
+              <a:rPr lang="en-US" dirty="0" smtClean="0"/>
+              <a:t>   next telescope. Or </a:t>
+            </a:r>
+            <a:r>
+              <a:rPr lang="en-US" dirty="0" smtClean="0">
+                <a:solidFill>
+                  <a:srgbClr val="FF0000"/>
+                </a:solidFill>
+              </a:rPr>
+              <a:t>input “2”</a:t>
+            </a:r>
+            <a:r>
+              <a:rPr lang="en-US" dirty="0" smtClean="0"/>
+              <a:t> to redo the fit. </a:t>
+            </a:r>
+            <a:endParaRPr lang="en-US" dirty="0"/>
+          </a:p>
+        </p:txBody>
+      </p:sp>
+      <p:pic>
+        <p:nvPicPr>
+          <p:cNvPr id="6" name="Picture 5"/>
+          <p:cNvPicPr>
+            <a:picLocks noChangeAspect="1"/>
+          </p:cNvPicPr>
+          <p:nvPr/>
+        </p:nvPicPr>
+        <p:blipFill>
+          <a:blip r:embed="rId4">
+            <a:extLst>
+              <a:ext uri="{28A0092B-C50C-407E-A947-70E740481C1C}">
+                <a14:useLocalDpi xmlns:a14="http://schemas.microsoft.com/office/drawing/2010/main" val="0"/>
+              </a:ext>
+            </a:extLst>
+          </a:blip>
+          <a:stretch>
+            <a:fillRect/>
+          </a:stretch>
+        </p:blipFill>
+        <p:spPr>
+          <a:xfrm>
+            <a:off x="331694" y="5244354"/>
+            <a:ext cx="6199262" cy="956676"/>
+          </a:xfrm>
+          <a:prstGeom prst="rect">
+            <a:avLst/>
+          </a:prstGeom>
+        </p:spPr>
+      </p:pic>
+      <p:sp>
+        <p:nvSpPr>
+          <p:cNvPr id="7" name="Oval 6"/>
+          <p:cNvSpPr/>
+          <p:nvPr/>
+        </p:nvSpPr>
+        <p:spPr>
+          <a:xfrm>
+            <a:off x="233083" y="5970493"/>
+            <a:ext cx="2958352" cy="361483"/>
+          </a:xfrm>
+          <a:prstGeom prst="ellipse">
+            <a:avLst/>
+          </a:prstGeom>
+          <a:noFill/>
+          <a:ln w="22225">
+            <a:solidFill>
+              <a:srgbClr val="FF0000"/>
+            </a:solidFill>
+          </a:ln>
+        </p:spPr>
+        <p:style>
+          <a:lnRef idx="2">
+            <a:schemeClr val="accent1">
+              <a:shade val="50000"/>
+            </a:schemeClr>
+          </a:lnRef>
+          <a:fillRef idx="1">
+            <a:schemeClr val="accent1"/>
+          </a:fillRef>
+          <a:effectRef idx="0">
+            <a:schemeClr val="accent1"/>
+          </a:effectRef>
+          <a:fontRef idx="minor">
+            <a:schemeClr val="lt1"/>
+          </a:fontRef>
+        </p:style>
+        <p:txBody>
+          <a:bodyPr rtlCol="0" anchor="ctr"/>
+          <a:lstStyle/>
+          <a:p>
+            <a:pPr algn="ctr"/>
+            <a:endParaRPr lang="en-US"/>
+          </a:p>
+        </p:txBody>
+      </p:sp>
     </p:spTree>
     <p:extLst>
       <p:ext uri="{BB962C8B-B14F-4D97-AF65-F5344CB8AC3E}">
@@ -13443,6 +15597,562 @@
           <a:chExt cx="0" cy="0"/>
         </a:xfrm>
       </p:grpSpPr>
+      <p:sp>
+        <p:nvSpPr>
+          <p:cNvPr id="2" name="Rectangle 1"/>
+          <p:cNvSpPr/>
+          <p:nvPr/>
+        </p:nvSpPr>
+        <p:spPr>
+          <a:xfrm>
+            <a:off x="125179" y="179628"/>
+            <a:ext cx="6951583" cy="646331"/>
+          </a:xfrm>
+          <a:prstGeom prst="rect">
+            <a:avLst/>
+          </a:prstGeom>
+        </p:spPr>
+        <p:txBody>
+          <a:bodyPr wrap="none">
+            <a:spAutoFit/>
+          </a:bodyPr>
+          <a:lstStyle/>
+          <a:p>
+            <a:r>
+              <a:rPr lang="en-US" b="1" u="sng" dirty="0" smtClean="0">
+                <a:latin typeface="Times New Roman" panose="02020603050405020304" pitchFamily="18" charset="0"/>
+                <a:cs typeface="Times New Roman" panose="02020603050405020304" pitchFamily="18" charset="0"/>
+              </a:rPr>
+              <a:t>Step </a:t>
+            </a:r>
+            <a:r>
+              <a:rPr lang="en-US" b="1" u="sng" dirty="0">
+                <a:latin typeface="Times New Roman" panose="02020603050405020304" pitchFamily="18" charset="0"/>
+                <a:cs typeface="Times New Roman" panose="02020603050405020304" pitchFamily="18" charset="0"/>
+              </a:rPr>
+              <a:t>2</a:t>
+            </a:r>
+            <a:r>
+              <a:rPr lang="en-US" b="1" u="sng" dirty="0" smtClean="0">
+                <a:latin typeface="Times New Roman" panose="02020603050405020304" pitchFamily="18" charset="0"/>
+                <a:cs typeface="Times New Roman" panose="02020603050405020304" pitchFamily="18" charset="0"/>
+              </a:rPr>
+              <a:t>:  </a:t>
+            </a:r>
+            <a:r>
+              <a:rPr lang="en-US" b="1" u="sng" dirty="0" smtClean="0">
+                <a:latin typeface="Times New Roman" panose="02020603050405020304" pitchFamily="18" charset="0"/>
+                <a:cs typeface="Times New Roman" panose="02020603050405020304" pitchFamily="18" charset="0"/>
+              </a:rPr>
+              <a:t>Use LISE++ to calculate the punch through points in MeV </a:t>
+            </a:r>
+            <a:endParaRPr lang="en-US" b="1" dirty="0" smtClean="0">
+              <a:solidFill>
+                <a:srgbClr val="81ABFF"/>
+              </a:solidFill>
+              <a:latin typeface="Times New Roman" panose="02020603050405020304" pitchFamily="18" charset="0"/>
+              <a:cs typeface="Times New Roman" panose="02020603050405020304" pitchFamily="18" charset="0"/>
+            </a:endParaRPr>
+          </a:p>
+          <a:p>
+            <a:endParaRPr lang="en-US" dirty="0" smtClean="0">
+              <a:solidFill>
+                <a:srgbClr val="FF0000"/>
+              </a:solidFill>
+              <a:latin typeface="Times New Roman" panose="02020603050405020304" pitchFamily="18" charset="0"/>
+              <a:cs typeface="Times New Roman" panose="02020603050405020304" pitchFamily="18" charset="0"/>
+            </a:endParaRPr>
+          </a:p>
+        </p:txBody>
+      </p:sp>
+      <p:sp>
+        <p:nvSpPr>
+          <p:cNvPr id="3" name="TextBox 2"/>
+          <p:cNvSpPr txBox="1"/>
+          <p:nvPr/>
+        </p:nvSpPr>
+        <p:spPr>
+          <a:xfrm>
+            <a:off x="250138" y="700453"/>
+            <a:ext cx="11627223" cy="923330"/>
+          </a:xfrm>
+          <a:prstGeom prst="rect">
+            <a:avLst/>
+          </a:prstGeom>
+          <a:noFill/>
+          <a:ln w="28575">
+            <a:solidFill>
+              <a:srgbClr val="FF0000"/>
+            </a:solidFill>
+          </a:ln>
+        </p:spPr>
+        <p:txBody>
+          <a:bodyPr wrap="square" rtlCol="0">
+            <a:spAutoFit/>
+          </a:bodyPr>
+          <a:lstStyle/>
+          <a:p>
+            <a:r>
+              <a:rPr lang="en-US" b="1" dirty="0" smtClean="0">
+                <a:solidFill>
+                  <a:srgbClr val="00B050"/>
+                </a:solidFill>
+              </a:rPr>
+              <a:t>Notes:</a:t>
+            </a:r>
+            <a:r>
+              <a:rPr lang="en-US" dirty="0" smtClean="0">
+                <a:solidFill>
+                  <a:srgbClr val="00B050"/>
+                </a:solidFill>
+              </a:rPr>
+              <a:t> </a:t>
+            </a:r>
+          </a:p>
+          <a:p>
+            <a:r>
+              <a:rPr lang="en-US" dirty="0" smtClean="0">
+                <a:solidFill>
+                  <a:srgbClr val="00B050"/>
+                </a:solidFill>
+              </a:rPr>
+              <a:t>   ● Punch through energy depends on the particle species and the length of the material</a:t>
+            </a:r>
+          </a:p>
+          <a:p>
+            <a:r>
+              <a:rPr lang="en-US" dirty="0">
+                <a:solidFill>
+                  <a:srgbClr val="00B050"/>
+                </a:solidFill>
+              </a:rPr>
+              <a:t> </a:t>
+            </a:r>
+            <a:r>
+              <a:rPr lang="en-US" dirty="0" smtClean="0">
+                <a:solidFill>
+                  <a:srgbClr val="00B050"/>
+                </a:solidFill>
+              </a:rPr>
+              <a:t>  ● For a certain particle in the a given material, the length is the only factor which determines the punch </a:t>
+            </a:r>
+            <a:r>
+              <a:rPr lang="en-US" dirty="0">
+                <a:solidFill>
+                  <a:srgbClr val="00B050"/>
+                </a:solidFill>
+              </a:rPr>
+              <a:t>through energy</a:t>
+            </a:r>
+            <a:r>
+              <a:rPr lang="en-US" dirty="0" smtClean="0">
+                <a:solidFill>
+                  <a:srgbClr val="00B050"/>
+                </a:solidFill>
+              </a:rPr>
+              <a:t> </a:t>
+            </a:r>
+            <a:endParaRPr lang="en-US" dirty="0">
+              <a:solidFill>
+                <a:srgbClr val="00B050"/>
+              </a:solidFill>
+            </a:endParaRPr>
+          </a:p>
+        </p:txBody>
+      </p:sp>
+      <p:sp>
+        <p:nvSpPr>
+          <p:cNvPr id="4" name="TextBox 3"/>
+          <p:cNvSpPr txBox="1"/>
+          <p:nvPr/>
+        </p:nvSpPr>
+        <p:spPr>
+          <a:xfrm>
+            <a:off x="349624" y="2088776"/>
+            <a:ext cx="9072282" cy="646331"/>
+          </a:xfrm>
+          <a:prstGeom prst="rect">
+            <a:avLst/>
+          </a:prstGeom>
+          <a:noFill/>
+        </p:spPr>
+        <p:txBody>
+          <a:bodyPr wrap="square" rtlCol="0">
+            <a:spAutoFit/>
+          </a:bodyPr>
+          <a:lstStyle/>
+          <a:p>
+            <a:r>
+              <a:rPr lang="en-US" dirty="0" smtClean="0"/>
+              <a:t>●  Directly, use </a:t>
+            </a:r>
+            <a:r>
+              <a:rPr lang="en-US" b="1" dirty="0" smtClean="0">
+                <a:solidFill>
+                  <a:srgbClr val="FF0000"/>
+                </a:solidFill>
+              </a:rPr>
+              <a:t>LISE++ </a:t>
+            </a:r>
+            <a:r>
+              <a:rPr lang="en-US" dirty="0" smtClean="0"/>
+              <a:t>to calculate the punch through energy. </a:t>
+            </a:r>
+          </a:p>
+          <a:p>
+            <a:r>
+              <a:rPr lang="en-US" dirty="0"/>
+              <a:t> </a:t>
+            </a:r>
+          </a:p>
+        </p:txBody>
+      </p:sp>
+      <p:sp>
+        <p:nvSpPr>
+          <p:cNvPr id="5" name="TextBox 4"/>
+          <p:cNvSpPr txBox="1"/>
+          <p:nvPr/>
+        </p:nvSpPr>
+        <p:spPr>
+          <a:xfrm>
+            <a:off x="349624" y="2644587"/>
+            <a:ext cx="9072282" cy="369332"/>
+          </a:xfrm>
+          <a:prstGeom prst="rect">
+            <a:avLst/>
+          </a:prstGeom>
+          <a:noFill/>
+        </p:spPr>
+        <p:txBody>
+          <a:bodyPr wrap="square" rtlCol="0">
+            <a:spAutoFit/>
+          </a:bodyPr>
+          <a:lstStyle/>
+          <a:p>
+            <a:r>
+              <a:rPr lang="en-US" dirty="0" smtClean="0"/>
+              <a:t>● More conveniently, use the program </a:t>
+            </a:r>
+            <a:r>
+              <a:rPr lang="en-US" b="1" dirty="0" smtClean="0">
+                <a:solidFill>
+                  <a:srgbClr val="FF0000"/>
+                </a:solidFill>
+              </a:rPr>
+              <a:t>“EnergyLossModule.cpp(by Daniele)”</a:t>
+            </a:r>
+            <a:endParaRPr lang="en-US" b="1" dirty="0">
+              <a:solidFill>
+                <a:srgbClr val="FF0000"/>
+              </a:solidFill>
+            </a:endParaRPr>
+          </a:p>
+        </p:txBody>
+      </p:sp>
+      <mc:AlternateContent xmlns:mc="http://schemas.openxmlformats.org/markup-compatibility/2006">
+        <mc:Choice xmlns:a14="http://schemas.microsoft.com/office/drawing/2010/main" Requires="a14">
+          <p:sp>
+            <p:nvSpPr>
+              <p:cNvPr id="6" name="TextBox 5"/>
+              <p:cNvSpPr txBox="1"/>
+              <p:nvPr/>
+            </p:nvSpPr>
+            <p:spPr>
+              <a:xfrm>
+                <a:off x="627530" y="3108065"/>
+                <a:ext cx="10578353" cy="923330"/>
+              </a:xfrm>
+              <a:prstGeom prst="rect">
+                <a:avLst/>
+              </a:prstGeom>
+              <a:noFill/>
+              <a:ln w="19050">
+                <a:solidFill>
+                  <a:srgbClr val="FF0000"/>
+                </a:solidFill>
+              </a:ln>
+            </p:spPr>
+            <p:txBody>
+              <a:bodyPr wrap="square" rtlCol="0">
+                <a:spAutoFit/>
+              </a:bodyPr>
+              <a:lstStyle/>
+              <a:p>
+                <a:r>
+                  <a:rPr lang="en-US" dirty="0" smtClean="0"/>
+                  <a:t>● Run EnergyLossModule.cpp:  </a:t>
+                </a:r>
+                <a:r>
+                  <a:rPr lang="en-US" b="1" dirty="0" smtClean="0">
+                    <a:solidFill>
+                      <a:srgbClr val="00B050"/>
+                    </a:solidFill>
+                  </a:rPr>
+                  <a:t>root –l EnergyLossModule.cpp</a:t>
+                </a:r>
+              </a:p>
+              <a:p>
+                <a:r>
+                  <a:rPr lang="en-US" dirty="0" smtClean="0"/>
+                  <a:t>● root[1] </a:t>
+                </a:r>
+                <a:r>
+                  <a:rPr lang="en-US" b="1" dirty="0" err="1" smtClean="0">
+                    <a:solidFill>
+                      <a:srgbClr val="00B050"/>
+                    </a:solidFill>
+                  </a:rPr>
+                  <a:t>EnergyLossModule</a:t>
+                </a:r>
+                <a:r>
+                  <a:rPr lang="en-US" b="1" dirty="0" smtClean="0">
+                    <a:solidFill>
+                      <a:srgbClr val="00B050"/>
+                    </a:solidFill>
+                  </a:rPr>
+                  <a:t> Fenhai </a:t>
+                </a:r>
+                <a:r>
+                  <a:rPr lang="en-US" b="1" dirty="0" smtClean="0">
+                    <a:solidFill>
+                      <a:srgbClr val="FF0000"/>
+                    </a:solidFill>
+                  </a:rPr>
+                  <a:t>(here can be any name you want)</a:t>
+                </a:r>
+              </a:p>
+              <a:p>
+                <a:r>
+                  <a:rPr lang="en-US" dirty="0"/>
+                  <a:t>● </a:t>
+                </a:r>
+                <a:r>
+                  <a:rPr lang="en-US" dirty="0" smtClean="0"/>
+                  <a:t>root[2] </a:t>
+                </a:r>
+                <a:r>
+                  <a:rPr lang="en-US" b="1" dirty="0" err="1" smtClean="0">
+                    <a:solidFill>
+                      <a:srgbClr val="00B050"/>
+                    </a:solidFill>
+                  </a:rPr>
+                  <a:t>Fenhai.GetEnergyFromRange</a:t>
+                </a:r>
+                <a:r>
+                  <a:rPr lang="en-US" b="1" dirty="0" smtClean="0">
+                    <a:solidFill>
+                      <a:srgbClr val="00B050"/>
+                    </a:solidFill>
+                  </a:rPr>
+                  <a:t>(</a:t>
+                </a:r>
+                <a:r>
+                  <a:rPr lang="en-US" b="1" dirty="0" err="1" smtClean="0">
+                    <a:solidFill>
+                      <a:srgbClr val="00B050"/>
+                    </a:solidFill>
+                  </a:rPr>
+                  <a:t>int</a:t>
+                </a:r>
+                <a:r>
+                  <a:rPr lang="en-US" b="1" dirty="0" smtClean="0">
+                    <a:solidFill>
+                      <a:srgbClr val="00B050"/>
+                    </a:solidFill>
+                  </a:rPr>
+                  <a:t> Z, </a:t>
+                </a:r>
+                <a:r>
+                  <a:rPr lang="en-US" b="1" dirty="0" err="1" smtClean="0">
+                    <a:solidFill>
+                      <a:srgbClr val="00B050"/>
+                    </a:solidFill>
+                  </a:rPr>
+                  <a:t>int</a:t>
+                </a:r>
+                <a:r>
+                  <a:rPr lang="en-US" b="1" dirty="0" smtClean="0">
+                    <a:solidFill>
+                      <a:srgbClr val="00B050"/>
+                    </a:solidFill>
+                  </a:rPr>
+                  <a:t> A, double range(</a:t>
+                </a:r>
+                <a14:m>
+                  <m:oMath xmlns:m="http://schemas.openxmlformats.org/officeDocument/2006/math">
+                    <m:r>
+                      <a:rPr lang="en-US" b="1" i="1" smtClean="0">
+                        <a:solidFill>
+                          <a:srgbClr val="00B050"/>
+                        </a:solidFill>
+                        <a:latin typeface="Cambria Math" panose="02040503050406030204" pitchFamily="18" charset="0"/>
+                        <a:ea typeface="Cambria Math" panose="02040503050406030204" pitchFamily="18" charset="0"/>
+                      </a:rPr>
+                      <m:t>𝝁</m:t>
+                    </m:r>
+                    <m:r>
+                      <a:rPr lang="en-US" b="1" i="1" smtClean="0">
+                        <a:solidFill>
+                          <a:srgbClr val="00B050"/>
+                        </a:solidFill>
+                        <a:latin typeface="Cambria Math" panose="02040503050406030204" pitchFamily="18" charset="0"/>
+                        <a:ea typeface="Cambria Math" panose="02040503050406030204" pitchFamily="18" charset="0"/>
+                      </a:rPr>
+                      <m:t>𝒎</m:t>
+                    </m:r>
+                  </m:oMath>
+                </a14:m>
+                <a:r>
+                  <a:rPr lang="en-US" b="1" dirty="0" smtClean="0">
+                    <a:solidFill>
+                      <a:srgbClr val="00B050"/>
+                    </a:solidFill>
+                  </a:rPr>
+                  <a:t>), </a:t>
+                </a:r>
+                <a:r>
+                  <a:rPr lang="en-US" b="1" dirty="0" err="1" smtClean="0">
+                    <a:solidFill>
+                      <a:srgbClr val="00B050"/>
+                    </a:solidFill>
+                  </a:rPr>
+                  <a:t>const</a:t>
+                </a:r>
+                <a:r>
+                  <a:rPr lang="en-US" b="1" dirty="0" smtClean="0">
+                    <a:solidFill>
+                      <a:srgbClr val="00B050"/>
+                    </a:solidFill>
+                  </a:rPr>
+                  <a:t> char* material, </a:t>
+                </a:r>
+                <a:r>
+                  <a:rPr lang="en-US" b="1" dirty="0" err="1" smtClean="0">
+                    <a:solidFill>
+                      <a:srgbClr val="00B050"/>
+                    </a:solidFill>
+                  </a:rPr>
+                  <a:t>int</a:t>
+                </a:r>
+                <a:r>
+                  <a:rPr lang="en-US" b="1" dirty="0" smtClean="0">
+                    <a:solidFill>
+                      <a:srgbClr val="00B050"/>
+                    </a:solidFill>
+                  </a:rPr>
+                  <a:t> model=1);</a:t>
+                </a:r>
+                <a:endParaRPr lang="en-US" b="1" dirty="0">
+                  <a:solidFill>
+                    <a:srgbClr val="FF0000"/>
+                  </a:solidFill>
+                </a:endParaRPr>
+              </a:p>
+            </p:txBody>
+          </p:sp>
+        </mc:Choice>
+        <mc:Fallback>
+          <p:sp>
+            <p:nvSpPr>
+              <p:cNvPr id="6" name="TextBox 5"/>
+              <p:cNvSpPr txBox="1">
+                <a:spLocks noRot="1" noChangeAspect="1" noMove="1" noResize="1" noEditPoints="1" noAdjustHandles="1" noChangeArrowheads="1" noChangeShapeType="1" noTextEdit="1"/>
+              </p:cNvSpPr>
+              <p:nvPr/>
+            </p:nvSpPr>
+            <p:spPr>
+              <a:xfrm>
+                <a:off x="627530" y="3108065"/>
+                <a:ext cx="10578353" cy="923330"/>
+              </a:xfrm>
+              <a:prstGeom prst="rect">
+                <a:avLst/>
+              </a:prstGeom>
+              <a:blipFill rotWithShape="0">
+                <a:blip r:embed="rId3"/>
+                <a:stretch>
+                  <a:fillRect l="-460" t="-3247" b="-8442"/>
+                </a:stretch>
+              </a:blipFill>
+              <a:ln w="19050">
+                <a:solidFill>
+                  <a:srgbClr val="FF0000"/>
+                </a:solidFill>
+              </a:ln>
+            </p:spPr>
+            <p:txBody>
+              <a:bodyPr/>
+              <a:lstStyle/>
+              <a:p>
+                <a:r>
+                  <a:rPr lang="en-US">
+                    <a:noFill/>
+                  </a:rPr>
+                  <a:t> </a:t>
+                </a:r>
+              </a:p>
+            </p:txBody>
+          </p:sp>
+        </mc:Fallback>
+      </mc:AlternateContent>
+      <p:sp>
+        <p:nvSpPr>
+          <p:cNvPr id="7" name="TextBox 6"/>
+          <p:cNvSpPr txBox="1"/>
+          <p:nvPr/>
+        </p:nvSpPr>
+        <p:spPr>
+          <a:xfrm>
+            <a:off x="349624" y="4313535"/>
+            <a:ext cx="11053482" cy="369332"/>
+          </a:xfrm>
+          <a:prstGeom prst="rect">
+            <a:avLst/>
+          </a:prstGeom>
+          <a:noFill/>
+        </p:spPr>
+        <p:txBody>
+          <a:bodyPr wrap="square" rtlCol="0">
+            <a:spAutoFit/>
+          </a:bodyPr>
+          <a:lstStyle/>
+          <a:p>
+            <a:r>
+              <a:rPr lang="en-US" dirty="0" smtClean="0"/>
+              <a:t>● The </a:t>
+            </a:r>
+            <a:r>
+              <a:rPr lang="en-US" b="1" dirty="0" smtClean="0">
+                <a:solidFill>
+                  <a:srgbClr val="FF0000"/>
+                </a:solidFill>
+              </a:rPr>
+              <a:t>errors of punch through points </a:t>
+            </a:r>
+            <a:r>
+              <a:rPr lang="en-US" dirty="0" smtClean="0"/>
+              <a:t>can be calculated by using the error of the length (</a:t>
+            </a:r>
+            <a:r>
+              <a:rPr lang="en-US" b="1" dirty="0" smtClean="0"/>
+              <a:t>by </a:t>
+            </a:r>
+            <a:r>
+              <a:rPr lang="en-US" b="1" dirty="0"/>
+              <a:t>the manufacturer</a:t>
+            </a:r>
+            <a:r>
+              <a:rPr lang="en-US" dirty="0" smtClean="0"/>
+              <a:t>) </a:t>
+            </a:r>
+            <a:endParaRPr lang="en-US" b="1" dirty="0">
+              <a:solidFill>
+                <a:srgbClr val="FF0000"/>
+              </a:solidFill>
+            </a:endParaRPr>
+          </a:p>
+        </p:txBody>
+      </p:sp>
     </p:spTree>
     <p:extLst>
       <p:ext uri="{BB962C8B-B14F-4D97-AF65-F5344CB8AC3E}">
@@ -13476,7 +16186,7 @@
     </p:spTree>
     <p:extLst>
       <p:ext uri="{BB962C8B-B14F-4D97-AF65-F5344CB8AC3E}">
-        <p14:creationId xmlns:p14="http://schemas.microsoft.com/office/powerpoint/2010/main" val="748716555"/>
+        <p14:creationId xmlns:p14="http://schemas.microsoft.com/office/powerpoint/2010/main" val="3653187026"/>
       </p:ext>
     </p:extLst>
   </p:cSld>
@@ -13503,10 +16213,61 @@
           <a:chExt cx="0" cy="0"/>
         </a:xfrm>
       </p:grpSpPr>
+      <p:sp>
+        <p:nvSpPr>
+          <p:cNvPr id="2" name="文本框 1"/>
+          <p:cNvSpPr txBox="1"/>
+          <p:nvPr/>
+        </p:nvSpPr>
+        <p:spPr>
+          <a:xfrm>
+            <a:off x="2011395" y="2006679"/>
+            <a:ext cx="8199405" cy="769441"/>
+          </a:xfrm>
+          <a:prstGeom prst="rect">
+            <a:avLst/>
+          </a:prstGeom>
+          <a:noFill/>
+        </p:spPr>
+        <p:txBody>
+          <a:bodyPr wrap="square" rtlCol="0">
+            <a:spAutoFit/>
+          </a:bodyPr>
+          <a:lstStyle/>
+          <a:p>
+            <a:r>
+              <a:rPr lang="en-US" altLang="zh-CN" sz="4400" b="1" u="sng" dirty="0" smtClean="0">
+                <a:solidFill>
+                  <a:schemeClr val="tx1">
+                    <a:lumMod val="95000"/>
+                    <a:lumOff val="5000"/>
+                  </a:schemeClr>
+                </a:solidFill>
+                <a:latin typeface="Times New Roman" panose="02020603050405020304" pitchFamily="18" charset="0"/>
+                <a:cs typeface="Times New Roman" panose="02020603050405020304" pitchFamily="18" charset="0"/>
+              </a:rPr>
+              <a:t> </a:t>
+            </a:r>
+            <a:r>
+              <a:rPr lang="en-US" altLang="zh-CN" sz="4000" b="1" u="sng" dirty="0" smtClean="0">
+                <a:solidFill>
+                  <a:schemeClr val="tx1">
+                    <a:lumMod val="95000"/>
+                    <a:lumOff val="5000"/>
+                  </a:schemeClr>
+                </a:solidFill>
+                <a:latin typeface="Times New Roman" panose="02020603050405020304" pitchFamily="18" charset="0"/>
+                <a:cs typeface="Times New Roman" panose="02020603050405020304" pitchFamily="18" charset="0"/>
+              </a:rPr>
+              <a:t>II. How to do simultaneous fit?</a:t>
+            </a:r>
+          </a:p>
+        </p:txBody>
+      </p:sp>
     </p:spTree>
     <p:extLst>
       <p:ext uri="{BB962C8B-B14F-4D97-AF65-F5344CB8AC3E}">
-        <p14:creationId xmlns:p14="http://schemas.microsoft.com/office/powerpoint/2010/main" val="3127142134"/>
+        <p14:creationId xmlns:p14="http://schemas.microsoft.com/office/powerpoint/2010/main" val="1593889559"/>
       </p:ext>
     </p:extLst>
   </p:cSld>
@@ -13536,7 +16297,7 @@
     </p:spTree>
     <p:extLst>
       <p:ext uri="{BB962C8B-B14F-4D97-AF65-F5344CB8AC3E}">
-        <p14:creationId xmlns:p14="http://schemas.microsoft.com/office/powerpoint/2010/main" val="3653187026"/>
+        <p14:creationId xmlns:p14="http://schemas.microsoft.com/office/powerpoint/2010/main" val="3791202161"/>
       </p:ext>
     </p:extLst>
   </p:cSld>
@@ -13563,61 +16324,10 @@
           <a:chExt cx="0" cy="0"/>
         </a:xfrm>
       </p:grpSpPr>
-      <p:sp>
-        <p:nvSpPr>
-          <p:cNvPr id="2" name="文本框 1"/>
-          <p:cNvSpPr txBox="1"/>
-          <p:nvPr/>
-        </p:nvSpPr>
-        <p:spPr>
-          <a:xfrm>
-            <a:off x="2011395" y="2006679"/>
-            <a:ext cx="8199405" cy="769441"/>
-          </a:xfrm>
-          <a:prstGeom prst="rect">
-            <a:avLst/>
-          </a:prstGeom>
-          <a:noFill/>
-        </p:spPr>
-        <p:txBody>
-          <a:bodyPr wrap="square" rtlCol="0">
-            <a:spAutoFit/>
-          </a:bodyPr>
-          <a:lstStyle/>
-          <a:p>
-            <a:r>
-              <a:rPr lang="en-US" altLang="zh-CN" sz="4400" b="1" u="sng" dirty="0" smtClean="0">
-                <a:solidFill>
-                  <a:schemeClr val="tx1">
-                    <a:lumMod val="95000"/>
-                    <a:lumOff val="5000"/>
-                  </a:schemeClr>
-                </a:solidFill>
-                <a:latin typeface="Times New Roman" panose="02020603050405020304" pitchFamily="18" charset="0"/>
-                <a:cs typeface="Times New Roman" panose="02020603050405020304" pitchFamily="18" charset="0"/>
-              </a:rPr>
-              <a:t> </a:t>
-            </a:r>
-            <a:r>
-              <a:rPr lang="en-US" altLang="zh-CN" sz="4000" b="1" u="sng" dirty="0" smtClean="0">
-                <a:solidFill>
-                  <a:schemeClr val="tx1">
-                    <a:lumMod val="95000"/>
-                    <a:lumOff val="5000"/>
-                  </a:schemeClr>
-                </a:solidFill>
-                <a:latin typeface="Times New Roman" panose="02020603050405020304" pitchFamily="18" charset="0"/>
-                <a:cs typeface="Times New Roman" panose="02020603050405020304" pitchFamily="18" charset="0"/>
-              </a:rPr>
-              <a:t>II. How to do simultaneous fit?</a:t>
-            </a:r>
-          </a:p>
-        </p:txBody>
-      </p:sp>
     </p:spTree>
     <p:extLst>
       <p:ext uri="{BB962C8B-B14F-4D97-AF65-F5344CB8AC3E}">
-        <p14:creationId xmlns:p14="http://schemas.microsoft.com/office/powerpoint/2010/main" val="1593889559"/>
+        <p14:creationId xmlns:p14="http://schemas.microsoft.com/office/powerpoint/2010/main" val="3837352207"/>
       </p:ext>
     </p:extLst>
   </p:cSld>
@@ -13647,7 +16357,7 @@
     </p:spTree>
     <p:extLst>
       <p:ext uri="{BB962C8B-B14F-4D97-AF65-F5344CB8AC3E}">
-        <p14:creationId xmlns:p14="http://schemas.microsoft.com/office/powerpoint/2010/main" val="3791202161"/>
+        <p14:creationId xmlns:p14="http://schemas.microsoft.com/office/powerpoint/2010/main" val="4032486691"/>
       </p:ext>
     </p:extLst>
   </p:cSld>
@@ -13932,7 +16642,7 @@
     </p:spTree>
     <p:extLst>
       <p:ext uri="{BB962C8B-B14F-4D97-AF65-F5344CB8AC3E}">
-        <p14:creationId xmlns:p14="http://schemas.microsoft.com/office/powerpoint/2010/main" val="3837352207"/>
+        <p14:creationId xmlns:p14="http://schemas.microsoft.com/office/powerpoint/2010/main" val="3692488892"/>
       </p:ext>
     </p:extLst>
   </p:cSld>
@@ -13962,7 +16672,7 @@
     </p:spTree>
     <p:extLst>
       <p:ext uri="{BB962C8B-B14F-4D97-AF65-F5344CB8AC3E}">
-        <p14:creationId xmlns:p14="http://schemas.microsoft.com/office/powerpoint/2010/main" val="4032486691"/>
+        <p14:creationId xmlns:p14="http://schemas.microsoft.com/office/powerpoint/2010/main" val="3342750008"/>
       </p:ext>
     </p:extLst>
   </p:cSld>
@@ -13989,10 +16699,48 @@
           <a:chExt cx="0" cy="0"/>
         </a:xfrm>
       </p:grpSpPr>
+      <p:sp>
+        <p:nvSpPr>
+          <p:cNvPr id="2" name="文本框 1"/>
+          <p:cNvSpPr txBox="1"/>
+          <p:nvPr/>
+        </p:nvSpPr>
+        <p:spPr>
+          <a:xfrm>
+            <a:off x="3131984" y="2257689"/>
+            <a:ext cx="6567828" cy="769441"/>
+          </a:xfrm>
+          <a:prstGeom prst="rect">
+            <a:avLst/>
+          </a:prstGeom>
+          <a:noFill/>
+        </p:spPr>
+        <p:txBody>
+          <a:bodyPr wrap="square" rtlCol="0">
+            <a:spAutoFit/>
+          </a:bodyPr>
+          <a:lstStyle/>
+          <a:p>
+            <a:r>
+              <a:rPr lang="en-US" altLang="zh-CN" sz="4400" b="1" u="sng" dirty="0" smtClean="0">
+                <a:solidFill>
+                  <a:schemeClr val="tx1">
+                    <a:lumMod val="95000"/>
+                    <a:lumOff val="5000"/>
+                  </a:schemeClr>
+                </a:solidFill>
+                <a:latin typeface="Times New Roman" panose="02020603050405020304" pitchFamily="18" charset="0"/>
+                <a:cs typeface="Times New Roman" panose="02020603050405020304" pitchFamily="18" charset="0"/>
+              </a:rPr>
+              <a:t>  Some basic questions?</a:t>
+            </a:r>
+          </a:p>
+        </p:txBody>
+      </p:sp>
     </p:spTree>
     <p:extLst>
       <p:ext uri="{BB962C8B-B14F-4D97-AF65-F5344CB8AC3E}">
-        <p14:creationId xmlns:p14="http://schemas.microsoft.com/office/powerpoint/2010/main" val="3692488892"/>
+        <p14:creationId xmlns:p14="http://schemas.microsoft.com/office/powerpoint/2010/main" val="1562348940"/>
       </p:ext>
     </p:extLst>
   </p:cSld>
@@ -14019,10 +16767,76 @@
           <a:chExt cx="0" cy="0"/>
         </a:xfrm>
       </p:grpSpPr>
+      <p:pic>
+        <p:nvPicPr>
+          <p:cNvPr id="2" name="图片 16"/>
+          <p:cNvPicPr>
+            <a:picLocks noChangeAspect="1"/>
+          </p:cNvPicPr>
+          <p:nvPr/>
+        </p:nvPicPr>
+        <p:blipFill>
+          <a:blip r:embed="rId2">
+            <a:extLst>
+              <a:ext uri="{28A0092B-C50C-407E-A947-70E740481C1C}">
+                <a14:useLocalDpi xmlns:a14="http://schemas.microsoft.com/office/drawing/2010/main" val="0"/>
+              </a:ext>
+            </a:extLst>
+          </a:blip>
+          <a:stretch>
+            <a:fillRect/>
+          </a:stretch>
+        </p:blipFill>
+        <p:spPr>
+          <a:xfrm>
+            <a:off x="6223001" y="2034988"/>
+            <a:ext cx="5673163" cy="4059368"/>
+          </a:xfrm>
+          <a:prstGeom prst="rect">
+            <a:avLst/>
+          </a:prstGeom>
+        </p:spPr>
+      </p:pic>
+      <p:sp>
+        <p:nvSpPr>
+          <p:cNvPr id="3" name="TextBox 2"/>
+          <p:cNvSpPr txBox="1"/>
+          <p:nvPr/>
+        </p:nvSpPr>
+        <p:spPr>
+          <a:xfrm>
+            <a:off x="466165" y="448235"/>
+            <a:ext cx="4312023" cy="369332"/>
+          </a:xfrm>
+          <a:prstGeom prst="rect">
+            <a:avLst/>
+          </a:prstGeom>
+          <a:noFill/>
+        </p:spPr>
+        <p:txBody>
+          <a:bodyPr wrap="square" rtlCol="0">
+            <a:spAutoFit/>
+          </a:bodyPr>
+          <a:lstStyle/>
+          <a:p>
+            <a:r>
+              <a:rPr lang="en-US" b="1" u="sng" dirty="0" smtClean="0">
+                <a:latin typeface="Times New Roman" panose="02020603050405020304" pitchFamily="18" charset="0"/>
+                <a:cs typeface="Times New Roman" panose="02020603050405020304" pitchFamily="18" charset="0"/>
+              </a:rPr>
+              <a:t>Q1: How to build the ∆E-E spectra?</a:t>
+            </a:r>
+            <a:endParaRPr lang="en-US" b="1" u="sng" dirty="0">
+              <a:latin typeface="Times New Roman" panose="02020603050405020304" pitchFamily="18" charset="0"/>
+              <a:cs typeface="Times New Roman" panose="02020603050405020304" pitchFamily="18" charset="0"/>
+            </a:endParaRPr>
+          </a:p>
+        </p:txBody>
+      </p:sp>
     </p:spTree>
     <p:extLst>
       <p:ext uri="{BB962C8B-B14F-4D97-AF65-F5344CB8AC3E}">
-        <p14:creationId xmlns:p14="http://schemas.microsoft.com/office/powerpoint/2010/main" val="3342750008"/>
+        <p14:creationId xmlns:p14="http://schemas.microsoft.com/office/powerpoint/2010/main" val="1846347787"/>
       </p:ext>
     </p:extLst>
   </p:cSld>
@@ -14049,16 +16863,46 @@
           <a:chExt cx="0" cy="0"/>
         </a:xfrm>
       </p:grpSpPr>
-      <p:sp>
-        <p:nvSpPr>
-          <p:cNvPr id="2" name="文本框 1"/>
+      <p:pic>
+        <p:nvPicPr>
+          <p:cNvPr id="2" name="图片 3"/>
+          <p:cNvPicPr>
+            <a:picLocks noChangeAspect="1"/>
+          </p:cNvPicPr>
+          <p:nvPr/>
+        </p:nvPicPr>
+        <p:blipFill>
+          <a:blip r:embed="rId2">
+            <a:extLst>
+              <a:ext uri="{28A0092B-C50C-407E-A947-70E740481C1C}">
+                <a14:useLocalDpi xmlns:a14="http://schemas.microsoft.com/office/drawing/2010/main" val="0"/>
+              </a:ext>
+            </a:extLst>
+          </a:blip>
+          <a:stretch>
+            <a:fillRect/>
+          </a:stretch>
+        </p:blipFill>
+        <p:spPr>
+          <a:xfrm>
+            <a:off x="8397471" y="1497620"/>
+            <a:ext cx="2782282" cy="4675895"/>
+          </a:xfrm>
+          <a:prstGeom prst="rect">
+            <a:avLst/>
+          </a:prstGeom>
+        </p:spPr>
+      </p:pic>
+      <p:sp>
+        <p:nvSpPr>
+          <p:cNvPr id="3" name="TextBox 2"/>
           <p:cNvSpPr txBox="1"/>
           <p:nvPr/>
         </p:nvSpPr>
         <p:spPr>
           <a:xfrm>
-            <a:off x="3131984" y="2257689"/>
-            <a:ext cx="6567828" cy="769441"/>
+            <a:off x="403412" y="286871"/>
+            <a:ext cx="4796117" cy="369332"/>
           </a:xfrm>
           <a:prstGeom prst="rect">
             <a:avLst/>
@@ -14072,25 +16916,23 @@
           <a:lstStyle/>
           <a:p>
             <a:r>
-              <a:rPr lang="en-US" altLang="zh-CN" sz="4400" b="1" u="sng" dirty="0" smtClean="0">
-                <a:solidFill>
-                  <a:schemeClr val="tx1">
-                    <a:lumMod val="95000"/>
-                    <a:lumOff val="5000"/>
-                  </a:schemeClr>
-                </a:solidFill>
-                <a:latin typeface="Times New Roman" panose="02020603050405020304" pitchFamily="18" charset="0"/>
-                <a:cs typeface="Times New Roman" panose="02020603050405020304" pitchFamily="18" charset="0"/>
-              </a:rPr>
-              <a:t>  Some basic questions?</a:t>
-            </a:r>
+              <a:rPr lang="en-US" b="1" u="sng" dirty="0" smtClean="0">
+                <a:latin typeface="Times New Roman" panose="02020603050405020304" pitchFamily="18" charset="0"/>
+                <a:cs typeface="Times New Roman" panose="02020603050405020304" pitchFamily="18" charset="0"/>
+              </a:rPr>
+              <a:t>Q2: How to build kinematics data ?</a:t>
+            </a:r>
+            <a:endParaRPr lang="en-US" b="1" u="sng" dirty="0">
+              <a:latin typeface="Times New Roman" panose="02020603050405020304" pitchFamily="18" charset="0"/>
+              <a:cs typeface="Times New Roman" panose="02020603050405020304" pitchFamily="18" charset="0"/>
+            </a:endParaRPr>
           </a:p>
         </p:txBody>
       </p:sp>
     </p:spTree>
     <p:extLst>
       <p:ext uri="{BB962C8B-B14F-4D97-AF65-F5344CB8AC3E}">
-        <p14:creationId xmlns:p14="http://schemas.microsoft.com/office/powerpoint/2010/main" val="1562348940"/>
+        <p14:creationId xmlns:p14="http://schemas.microsoft.com/office/powerpoint/2010/main" val="2669361846"/>
       </p:ext>
     </p:extLst>
   </p:cSld>
@@ -14117,46 +16959,16 @@
           <a:chExt cx="0" cy="0"/>
         </a:xfrm>
       </p:grpSpPr>
-      <p:pic>
-        <p:nvPicPr>
-          <p:cNvPr id="2" name="图片 16"/>
-          <p:cNvPicPr>
-            <a:picLocks noChangeAspect="1"/>
-          </p:cNvPicPr>
-          <p:nvPr/>
-        </p:nvPicPr>
-        <p:blipFill>
-          <a:blip r:embed="rId2">
-            <a:extLst>
-              <a:ext uri="{28A0092B-C50C-407E-A947-70E740481C1C}">
-                <a14:useLocalDpi xmlns:a14="http://schemas.microsoft.com/office/drawing/2010/main" val="0"/>
-              </a:ext>
-            </a:extLst>
-          </a:blip>
-          <a:stretch>
-            <a:fillRect/>
-          </a:stretch>
-        </p:blipFill>
-        <p:spPr>
-          <a:xfrm>
-            <a:off x="6223001" y="2034988"/>
-            <a:ext cx="5673163" cy="4059368"/>
-          </a:xfrm>
-          <a:prstGeom prst="rect">
-            <a:avLst/>
-          </a:prstGeom>
-        </p:spPr>
-      </p:pic>
-      <p:sp>
-        <p:nvSpPr>
-          <p:cNvPr id="3" name="TextBox 2"/>
+      <p:sp>
+        <p:nvSpPr>
+          <p:cNvPr id="2" name="TextBox 1"/>
           <p:cNvSpPr txBox="1"/>
           <p:nvPr/>
         </p:nvSpPr>
         <p:spPr>
           <a:xfrm>
-            <a:off x="466165" y="448235"/>
-            <a:ext cx="4312023" cy="369332"/>
+            <a:off x="403412" y="286871"/>
+            <a:ext cx="6678706" cy="369332"/>
           </a:xfrm>
           <a:prstGeom prst="rect">
             <a:avLst/>
@@ -14174,197 +16986,7 @@
                 <a:latin typeface="Times New Roman" panose="02020603050405020304" pitchFamily="18" charset="0"/>
                 <a:cs typeface="Times New Roman" panose="02020603050405020304" pitchFamily="18" charset="0"/>
               </a:rPr>
-              <a:t>Q1: How to build the ∆E-E spectra?</a:t>
-            </a:r>
-            <a:endParaRPr lang="en-US" b="1" u="sng" dirty="0">
-              <a:latin typeface="Times New Roman" panose="02020603050405020304" pitchFamily="18" charset="0"/>
-              <a:cs typeface="Times New Roman" panose="02020603050405020304" pitchFamily="18" charset="0"/>
-            </a:endParaRPr>
-          </a:p>
-        </p:txBody>
-      </p:sp>
-    </p:spTree>
-    <p:extLst>
-      <p:ext uri="{BB962C8B-B14F-4D97-AF65-F5344CB8AC3E}">
-        <p14:creationId xmlns:p14="http://schemas.microsoft.com/office/powerpoint/2010/main" val="1846347787"/>
-      </p:ext>
-    </p:extLst>
-  </p:cSld>
-  <p:clrMapOvr>
-    <a:masterClrMapping/>
-  </p:clrMapOvr>
-</p:sld>
-</file>
-
-<file path=ppt/slides/slide46.xml><?xml version="1.0" encoding="utf-8"?>
-<p:sld xmlns:a="http://schemas.openxmlformats.org/drawingml/2006/main" xmlns:r="http://schemas.openxmlformats.org/officeDocument/2006/relationships" xmlns:p="http://schemas.openxmlformats.org/presentationml/2006/main">
-  <p:cSld>
-    <p:spTree>
-      <p:nvGrpSpPr>
-        <p:cNvPr id="1" name=""/>
-        <p:cNvGrpSpPr/>
-        <p:nvPr/>
-      </p:nvGrpSpPr>
-      <p:grpSpPr>
-        <a:xfrm>
-          <a:off x="0" y="0"/>
-          <a:ext cx="0" cy="0"/>
-          <a:chOff x="0" y="0"/>
-          <a:chExt cx="0" cy="0"/>
-        </a:xfrm>
-      </p:grpSpPr>
-      <p:pic>
-        <p:nvPicPr>
-          <p:cNvPr id="2" name="图片 3"/>
-          <p:cNvPicPr>
-            <a:picLocks noChangeAspect="1"/>
-          </p:cNvPicPr>
-          <p:nvPr/>
-        </p:nvPicPr>
-        <p:blipFill>
-          <a:blip r:embed="rId2">
-            <a:extLst>
-              <a:ext uri="{28A0092B-C50C-407E-A947-70E740481C1C}">
-                <a14:useLocalDpi xmlns:a14="http://schemas.microsoft.com/office/drawing/2010/main" val="0"/>
-              </a:ext>
-            </a:extLst>
-          </a:blip>
-          <a:stretch>
-            <a:fillRect/>
-          </a:stretch>
-        </p:blipFill>
-        <p:spPr>
-          <a:xfrm>
-            <a:off x="8397471" y="1497620"/>
-            <a:ext cx="2782282" cy="4675895"/>
-          </a:xfrm>
-          <a:prstGeom prst="rect">
-            <a:avLst/>
-          </a:prstGeom>
-        </p:spPr>
-      </p:pic>
-      <p:sp>
-        <p:nvSpPr>
-          <p:cNvPr id="3" name="TextBox 2"/>
-          <p:cNvSpPr txBox="1"/>
-          <p:nvPr/>
-        </p:nvSpPr>
-        <p:spPr>
-          <a:xfrm>
-            <a:off x="403412" y="286871"/>
-            <a:ext cx="4796117" cy="369332"/>
-          </a:xfrm>
-          <a:prstGeom prst="rect">
-            <a:avLst/>
-          </a:prstGeom>
-          <a:noFill/>
-        </p:spPr>
-        <p:txBody>
-          <a:bodyPr wrap="square" rtlCol="0">
-            <a:spAutoFit/>
-          </a:bodyPr>
-          <a:lstStyle/>
-          <a:p>
-            <a:r>
-              <a:rPr lang="en-US" b="1" u="sng" dirty="0" smtClean="0">
-                <a:latin typeface="Times New Roman" panose="02020603050405020304" pitchFamily="18" charset="0"/>
-                <a:cs typeface="Times New Roman" panose="02020603050405020304" pitchFamily="18" charset="0"/>
-              </a:rPr>
-              <a:t>Q2: How to build kinematics data ?</a:t>
-            </a:r>
-            <a:endParaRPr lang="en-US" b="1" u="sng" dirty="0">
-              <a:latin typeface="Times New Roman" panose="02020603050405020304" pitchFamily="18" charset="0"/>
-              <a:cs typeface="Times New Roman" panose="02020603050405020304" pitchFamily="18" charset="0"/>
-            </a:endParaRPr>
-          </a:p>
-        </p:txBody>
-      </p:sp>
-    </p:spTree>
-    <p:extLst>
-      <p:ext uri="{BB962C8B-B14F-4D97-AF65-F5344CB8AC3E}">
-        <p14:creationId xmlns:p14="http://schemas.microsoft.com/office/powerpoint/2010/main" val="2669361846"/>
-      </p:ext>
-    </p:extLst>
-  </p:cSld>
-  <p:clrMapOvr>
-    <a:masterClrMapping/>
-  </p:clrMapOvr>
-</p:sld>
-</file>
-
-<file path=ppt/slides/slide47.xml><?xml version="1.0" encoding="utf-8"?>
-<p:sld xmlns:a="http://schemas.openxmlformats.org/drawingml/2006/main" xmlns:r="http://schemas.openxmlformats.org/officeDocument/2006/relationships" xmlns:p="http://schemas.openxmlformats.org/presentationml/2006/main">
-  <p:cSld>
-    <p:spTree>
-      <p:nvGrpSpPr>
-        <p:cNvPr id="1" name=""/>
-        <p:cNvGrpSpPr/>
-        <p:nvPr/>
-      </p:nvGrpSpPr>
-      <p:grpSpPr>
-        <a:xfrm>
-          <a:off x="0" y="0"/>
-          <a:ext cx="0" cy="0"/>
-          <a:chOff x="0" y="0"/>
-          <a:chExt cx="0" cy="0"/>
-        </a:xfrm>
-      </p:grpSpPr>
-      <p:sp>
-        <p:nvSpPr>
-          <p:cNvPr id="2" name="TextBox 1"/>
-          <p:cNvSpPr txBox="1"/>
-          <p:nvPr/>
-        </p:nvSpPr>
-        <p:spPr>
-          <a:xfrm>
-            <a:off x="403412" y="286871"/>
-            <a:ext cx="6678706" cy="369332"/>
-          </a:xfrm>
-          <a:prstGeom prst="rect">
-            <a:avLst/>
-          </a:prstGeom>
-          <a:noFill/>
-        </p:spPr>
-        <p:txBody>
-          <a:bodyPr wrap="square" rtlCol="0">
-            <a:spAutoFit/>
-          </a:bodyPr>
-          <a:lstStyle/>
-          <a:p>
-            <a:r>
-              <a:rPr lang="en-US" b="1" u="sng" dirty="0" smtClean="0">
-                <a:latin typeface="Times New Roman" panose="02020603050405020304" pitchFamily="18" charset="0"/>
-                <a:cs typeface="Times New Roman" panose="02020603050405020304" pitchFamily="18" charset="0"/>
-              </a:rPr>
-              <a:t>Q3: </a:t>
-            </a:r>
-            <a:r>
-              <a:rPr lang="en-US" b="1" u="sng" dirty="0" smtClean="0">
-                <a:latin typeface="Times New Roman" panose="02020603050405020304" pitchFamily="18" charset="0"/>
-                <a:cs typeface="Times New Roman" panose="02020603050405020304" pitchFamily="18" charset="0"/>
-              </a:rPr>
-              <a:t>How to </a:t>
-            </a:r>
-            <a:r>
-              <a:rPr lang="en-US" b="1" u="sng" dirty="0" smtClean="0">
-                <a:latin typeface="Times New Roman" panose="02020603050405020304" pitchFamily="18" charset="0"/>
-                <a:cs typeface="Times New Roman" panose="02020603050405020304" pitchFamily="18" charset="0"/>
-              </a:rPr>
-              <a:t>use Fermi function fit to get punch-through points</a:t>
-            </a:r>
-            <a:r>
-              <a:rPr lang="en-US" b="1" u="sng" dirty="0" smtClean="0">
-                <a:latin typeface="Times New Roman" panose="02020603050405020304" pitchFamily="18" charset="0"/>
-                <a:cs typeface="Times New Roman" panose="02020603050405020304" pitchFamily="18" charset="0"/>
-              </a:rPr>
-              <a:t> </a:t>
-            </a:r>
-            <a:r>
-              <a:rPr lang="en-US" b="1" u="sng" dirty="0" smtClean="0">
-                <a:latin typeface="Times New Roman" panose="02020603050405020304" pitchFamily="18" charset="0"/>
-                <a:cs typeface="Times New Roman" panose="02020603050405020304" pitchFamily="18" charset="0"/>
-              </a:rPr>
-              <a:t>?</a:t>
+              <a:t>Q3: How to use Fermi function fit to get punch-through points ?</a:t>
             </a:r>
             <a:endParaRPr lang="en-US" b="1" u="sng" dirty="0">
               <a:latin typeface="Times New Roman" panose="02020603050405020304" pitchFamily="18" charset="0"/>
@@ -14494,7 +17116,7 @@
 </p:sld>
 </file>
 
-<file path=ppt/slides/slide48.xml><?xml version="1.0" encoding="utf-8"?>
+<file path=ppt/slides/slide46.xml><?xml version="1.0" encoding="utf-8"?>
 <p:sld xmlns:a="http://schemas.openxmlformats.org/drawingml/2006/main" xmlns:r="http://schemas.openxmlformats.org/officeDocument/2006/relationships" xmlns:p="http://schemas.openxmlformats.org/presentationml/2006/main">
   <p:cSld>
     <p:spTree>

</xml_diff>

<commit_message>
Added two PhD thesis on DE-E detector.
</commit_message>
<xml_diff>
--- a/2018Oct-Tutorial_HiRACsICalibrations.pptx
+++ b/2018Oct-Tutorial_HiRACsICalibrations.pptx
@@ -16838,17 +16838,10 @@
                 <a:latin typeface="Times New Roman" panose="02020603050405020304" pitchFamily="18" charset="0"/>
                 <a:cs typeface="Times New Roman" panose="02020603050405020304" pitchFamily="18" charset="0"/>
               </a:rPr>
-              <a:t>to fit the data of protons, deuterons and </a:t>
+              <a:t>to fit the data of protons, deuterons and tritons </a:t>
             </a:r>
             <a:r>
               <a:rPr lang="en-US" dirty="0" smtClean="0">
-                <a:latin typeface="Times New Roman" panose="02020603050405020304" pitchFamily="18" charset="0"/>
-                <a:cs typeface="Times New Roman" panose="02020603050405020304" pitchFamily="18" charset="0"/>
-              </a:rPr>
-              <a:t>tritons </a:t>
-            </a:r>
-            <a:r>
-              <a:rPr lang="en-US" dirty="0" smtClean="0">
                 <a:solidFill>
                   <a:srgbClr val="FF0000"/>
                 </a:solidFill>
@@ -16857,13 +16850,6 @@
               </a:rPr>
               <a:t>(Z=1)</a:t>
             </a:r>
-            <a:endParaRPr lang="en-US" dirty="0" smtClean="0">
-              <a:solidFill>
-                <a:srgbClr val="FF0000"/>
-              </a:solidFill>
-              <a:latin typeface="Times New Roman" panose="02020603050405020304" pitchFamily="18" charset="0"/>
-              <a:cs typeface="Times New Roman" panose="02020603050405020304" pitchFamily="18" charset="0"/>
-            </a:endParaRPr>
           </a:p>
           <a:p>
             <a:pPr algn="ctr"/>
@@ -20570,7 +20556,7 @@
           <a:graphicData uri="http://schemas.openxmlformats.org/presentationml/2006/ole">
             <mc:AlternateContent xmlns:mc="http://schemas.openxmlformats.org/markup-compatibility/2006">
               <mc:Choice xmlns:v="urn:schemas-microsoft-com:vml" Requires="v">
-                <p:oleObj spid="_x0000_s2054" name="Acrobat Document" r:id="rId5" imgW="5400473" imgH="3886161" progId="AcroExch.Document.2017">
+                <p:oleObj spid="_x0000_s2056" name="Acrobat Document" r:id="rId5" imgW="5400473" imgH="3886161" progId="AcroExch.Document.2017">
                   <p:embed/>
                 </p:oleObj>
               </mc:Choice>

</xml_diff>